<commit_message>
added typscript code for unit testing
</commit_message>
<xml_diff>
--- a/docs/IaC_Devopedia_Sep_2022.pptx
+++ b/docs/IaC_Devopedia_Sep_2022.pptx
@@ -37,6 +37,7 @@
     <p:sldId id="276" r:id="rId31"/>
     <p:sldId id="287" r:id="rId32"/>
     <p:sldId id="288" r:id="rId33"/>
+    <p:sldId id="289" r:id="rId34"/>
   </p:sldIdLst>
   <p:sldSz cx="12192000" cy="6858000"/>
   <p:notesSz cx="6858000" cy="9144000"/>
@@ -3500,7 +3501,7 @@
           <a:p>
             <a:fld id="{4567C160-2C30-4694-9FA0-F603C7AEC858}" type="datetimeFigureOut">
               <a:rPr lang="en-IN" smtClean="0"/>
-              <a:t>21-08-2022</a:t>
+              <a:t>22-08-2022</a:t>
             </a:fld>
             <a:endParaRPr lang="en-IN"/>
           </a:p>
@@ -3679,7 +3680,7 @@
           <a:p>
             <a:fld id="{4567C160-2C30-4694-9FA0-F603C7AEC858}" type="datetimeFigureOut">
               <a:rPr lang="en-IN" smtClean="0"/>
-              <a:t>21-08-2022</a:t>
+              <a:t>22-08-2022</a:t>
             </a:fld>
             <a:endParaRPr lang="en-IN"/>
           </a:p>
@@ -3859,7 +3860,7 @@
           <a:p>
             <a:fld id="{4567C160-2C30-4694-9FA0-F603C7AEC858}" type="datetimeFigureOut">
               <a:rPr lang="en-IN" smtClean="0"/>
-              <a:t>21-08-2022</a:t>
+              <a:t>22-08-2022</a:t>
             </a:fld>
             <a:endParaRPr lang="en-IN"/>
           </a:p>
@@ -4029,7 +4030,7 @@
           <a:p>
             <a:fld id="{4567C160-2C30-4694-9FA0-F603C7AEC858}" type="datetimeFigureOut">
               <a:rPr lang="en-IN" smtClean="0"/>
-              <a:t>21-08-2022</a:t>
+              <a:t>22-08-2022</a:t>
             </a:fld>
             <a:endParaRPr lang="en-IN"/>
           </a:p>
@@ -4342,7 +4343,7 @@
           <a:p>
             <a:fld id="{4567C160-2C30-4694-9FA0-F603C7AEC858}" type="datetimeFigureOut">
               <a:rPr lang="en-IN" smtClean="0"/>
-              <a:t>21-08-2022</a:t>
+              <a:t>22-08-2022</a:t>
             </a:fld>
             <a:endParaRPr lang="en-IN"/>
           </a:p>
@@ -4728,7 +4729,7 @@
           <a:p>
             <a:fld id="{4567C160-2C30-4694-9FA0-F603C7AEC858}" type="datetimeFigureOut">
               <a:rPr lang="en-IN" smtClean="0"/>
-              <a:t>21-08-2022</a:t>
+              <a:t>22-08-2022</a:t>
             </a:fld>
             <a:endParaRPr lang="en-IN"/>
           </a:p>
@@ -5162,7 +5163,7 @@
           <a:p>
             <a:fld id="{4567C160-2C30-4694-9FA0-F603C7AEC858}" type="datetimeFigureOut">
               <a:rPr lang="en-IN" smtClean="0"/>
-              <a:t>21-08-2022</a:t>
+              <a:t>22-08-2022</a:t>
             </a:fld>
             <a:endParaRPr lang="en-IN"/>
           </a:p>
@@ -5280,7 +5281,7 @@
           <a:p>
             <a:fld id="{4567C160-2C30-4694-9FA0-F603C7AEC858}" type="datetimeFigureOut">
               <a:rPr lang="en-IN" smtClean="0"/>
-              <a:t>21-08-2022</a:t>
+              <a:t>22-08-2022</a:t>
             </a:fld>
             <a:endParaRPr lang="en-IN"/>
           </a:p>
@@ -5375,7 +5376,7 @@
           <a:p>
             <a:fld id="{4567C160-2C30-4694-9FA0-F603C7AEC858}" type="datetimeFigureOut">
               <a:rPr lang="en-IN" smtClean="0"/>
-              <a:t>21-08-2022</a:t>
+              <a:t>22-08-2022</a:t>
             </a:fld>
             <a:endParaRPr lang="en-IN"/>
           </a:p>
@@ -5725,7 +5726,7 @@
           <a:p>
             <a:fld id="{4567C160-2C30-4694-9FA0-F603C7AEC858}" type="datetimeFigureOut">
               <a:rPr lang="en-IN" smtClean="0"/>
-              <a:t>21-08-2022</a:t>
+              <a:t>22-08-2022</a:t>
             </a:fld>
             <a:endParaRPr lang="en-IN"/>
           </a:p>
@@ -6150,7 +6151,7 @@
           <a:p>
             <a:fld id="{4567C160-2C30-4694-9FA0-F603C7AEC858}" type="datetimeFigureOut">
               <a:rPr lang="en-IN" smtClean="0"/>
-              <a:t>21-08-2022</a:t>
+              <a:t>22-08-2022</a:t>
             </a:fld>
             <a:endParaRPr lang="en-IN"/>
           </a:p>
@@ -6431,7 +6432,7 @@
           <a:p>
             <a:fld id="{4567C160-2C30-4694-9FA0-F603C7AEC858}" type="datetimeFigureOut">
               <a:rPr lang="en-IN" smtClean="0"/>
-              <a:t>21-08-2022</a:t>
+              <a:t>22-08-2022</a:t>
             </a:fld>
             <a:endParaRPr lang="en-IN"/>
           </a:p>
@@ -10021,42 +10022,1526 @@
           </a:p>
         </p:txBody>
       </p:sp>
-      <p:sp>
-        <p:nvSpPr>
-          <p:cNvPr id="3" name="Content Placeholder 2">
+      <p:graphicFrame>
+        <p:nvGraphicFramePr>
+          <p:cNvPr id="4" name="Table 3">
             <a:extLst>
               <a:ext uri="{FF2B5EF4-FFF2-40B4-BE49-F238E27FC236}">
-                <a16:creationId xmlns:a16="http://schemas.microsoft.com/office/drawing/2014/main" id="{3BD40128-92F4-353D-EF08-1839BE8CB85C}"/>
+                <a16:creationId xmlns:a16="http://schemas.microsoft.com/office/drawing/2014/main" id="{C94A042C-D780-05B1-02D0-0EF6D1E32163}"/>
               </a:ext>
             </a:extLst>
           </p:cNvPr>
-          <p:cNvSpPr>
-            <a:spLocks noGrp="1"/>
-          </p:cNvSpPr>
+          <p:cNvGraphicFramePr>
+            <a:graphicFrameLocks noGrp="1"/>
+          </p:cNvGraphicFramePr>
           <p:nvPr>
-            <p:ph idx="1"/>
+            <p:extLst>
+              <p:ext uri="{D42A27DB-BD31-4B8C-83A1-F6EECF244321}">
+                <p14:modId xmlns:p14="http://schemas.microsoft.com/office/powerpoint/2010/main" val="1543109962"/>
+              </p:ext>
+            </p:extLst>
           </p:nvPr>
+        </p:nvGraphicFramePr>
+        <p:xfrm>
+          <a:off x="532647" y="3562447"/>
+          <a:ext cx="10058400" cy="3291840"/>
+        </p:xfrm>
+        <a:graphic>
+          <a:graphicData uri="http://schemas.openxmlformats.org/drawingml/2006/table">
+            <a:tbl>
+              <a:tblPr/>
+              <a:tblGrid>
+                <a:gridCol w="2514600">
+                  <a:extLst>
+                    <a:ext uri="{9D8B030D-6E8A-4147-A177-3AD203B41FA5}">
+                      <a16:colId xmlns:a16="http://schemas.microsoft.com/office/drawing/2014/main" val="352084460"/>
+                    </a:ext>
+                  </a:extLst>
+                </a:gridCol>
+                <a:gridCol w="2514600">
+                  <a:extLst>
+                    <a:ext uri="{9D8B030D-6E8A-4147-A177-3AD203B41FA5}">
+                      <a16:colId xmlns:a16="http://schemas.microsoft.com/office/drawing/2014/main" val="4163147410"/>
+                    </a:ext>
+                  </a:extLst>
+                </a:gridCol>
+                <a:gridCol w="2514600">
+                  <a:extLst>
+                    <a:ext uri="{9D8B030D-6E8A-4147-A177-3AD203B41FA5}">
+                      <a16:colId xmlns:a16="http://schemas.microsoft.com/office/drawing/2014/main" val="944226593"/>
+                    </a:ext>
+                  </a:extLst>
+                </a:gridCol>
+                <a:gridCol w="2514600">
+                  <a:extLst>
+                    <a:ext uri="{9D8B030D-6E8A-4147-A177-3AD203B41FA5}">
+                      <a16:colId xmlns:a16="http://schemas.microsoft.com/office/drawing/2014/main" val="3515353871"/>
+                    </a:ext>
+                  </a:extLst>
+                </a:gridCol>
+              </a:tblGrid>
+              <a:tr h="0">
+                <a:tc>
+                  <a:txBody>
+                    <a:bodyPr/>
+                    <a:lstStyle/>
+                    <a:p>
+                      <a:pPr algn="l"/>
+                      <a:endParaRPr lang="en-IN" b="0">
+                        <a:effectLst/>
+                      </a:endParaRPr>
+                    </a:p>
+                  </a:txBody>
+                  <a:tcPr anchor="ctr">
+                    <a:lnL w="12700" cap="flat" cmpd="sng" algn="ctr">
+                      <a:solidFill>
+                        <a:srgbClr val="00CC2D"/>
+                      </a:solidFill>
+                      <a:prstDash val="solid"/>
+                      <a:round/>
+                      <a:headEnd type="none" w="med" len="med"/>
+                      <a:tailEnd type="none" w="med" len="med"/>
+                    </a:lnL>
+                    <a:lnR w="12700" cap="flat" cmpd="sng" algn="ctr">
+                      <a:solidFill>
+                        <a:srgbClr val="40CE2D"/>
+                      </a:solidFill>
+                      <a:prstDash val="solid"/>
+                      <a:round/>
+                      <a:headEnd type="none" w="med" len="med"/>
+                      <a:tailEnd type="none" w="med" len="med"/>
+                    </a:lnR>
+                    <a:lnT w="12700" cap="flat" cmpd="sng" algn="ctr">
+                      <a:solidFill>
+                        <a:srgbClr val="00CC2D"/>
+                      </a:solidFill>
+                      <a:prstDash val="solid"/>
+                      <a:round/>
+                      <a:headEnd type="none" w="med" len="med"/>
+                      <a:tailEnd type="none" w="med" len="med"/>
+                    </a:lnT>
+                    <a:lnB w="12700" cap="flat" cmpd="sng" algn="ctr">
+                      <a:solidFill>
+                        <a:srgbClr val="60CC2D"/>
+                      </a:solidFill>
+                      <a:prstDash val="solid"/>
+                      <a:round/>
+                      <a:headEnd type="none" w="med" len="med"/>
+                      <a:tailEnd type="none" w="med" len="med"/>
+                    </a:lnB>
+                  </a:tcPr>
+                </a:tc>
+                <a:tc>
+                  <a:txBody>
+                    <a:bodyPr/>
+                    <a:lstStyle/>
+                    <a:p>
+                      <a:pPr algn="l"/>
+                      <a:r>
+                        <a:rPr lang="en-IN" b="1" dirty="0">
+                          <a:effectLst/>
+                          <a:hlinkClick r:id="rId2"/>
+                        </a:rPr>
+                        <a:t>Unit Tests</a:t>
+                      </a:r>
+                      <a:endParaRPr lang="en-IN" b="0" dirty="0">
+                        <a:effectLst/>
+                      </a:endParaRPr>
+                    </a:p>
+                  </a:txBody>
+                  <a:tcPr anchor="ctr">
+                    <a:lnL w="12700" cap="flat" cmpd="sng" algn="ctr">
+                      <a:solidFill>
+                        <a:srgbClr val="40CE2D"/>
+                      </a:solidFill>
+                      <a:prstDash val="solid"/>
+                      <a:round/>
+                      <a:headEnd type="none" w="med" len="med"/>
+                      <a:tailEnd type="none" w="med" len="med"/>
+                    </a:lnL>
+                    <a:lnR w="12700" cap="flat" cmpd="sng" algn="ctr">
+                      <a:solidFill>
+                        <a:srgbClr val="C0CC2D"/>
+                      </a:solidFill>
+                      <a:prstDash val="solid"/>
+                      <a:round/>
+                      <a:headEnd type="none" w="med" len="med"/>
+                      <a:tailEnd type="none" w="med" len="med"/>
+                    </a:lnR>
+                    <a:lnT w="12700" cap="flat" cmpd="sng" algn="ctr">
+                      <a:solidFill>
+                        <a:srgbClr val="40CE2D"/>
+                      </a:solidFill>
+                      <a:prstDash val="solid"/>
+                      <a:round/>
+                      <a:headEnd type="none" w="med" len="med"/>
+                      <a:tailEnd type="none" w="med" len="med"/>
+                    </a:lnT>
+                    <a:lnB w="12700" cap="flat" cmpd="sng" algn="ctr">
+                      <a:solidFill>
+                        <a:srgbClr val="80CD2D"/>
+                      </a:solidFill>
+                      <a:prstDash val="solid"/>
+                      <a:round/>
+                      <a:headEnd type="none" w="med" len="med"/>
+                      <a:tailEnd type="none" w="med" len="med"/>
+                    </a:lnB>
+                  </a:tcPr>
+                </a:tc>
+                <a:tc>
+                  <a:txBody>
+                    <a:bodyPr/>
+                    <a:lstStyle/>
+                    <a:p>
+                      <a:pPr algn="l"/>
+                      <a:r>
+                        <a:rPr lang="en-IN" b="1">
+                          <a:effectLst/>
+                          <a:hlinkClick r:id="rId3"/>
+                        </a:rPr>
+                        <a:t>Property Tests</a:t>
+                      </a:r>
+                      <a:endParaRPr lang="en-IN" b="0">
+                        <a:effectLst/>
+                      </a:endParaRPr>
+                    </a:p>
+                  </a:txBody>
+                  <a:tcPr anchor="ctr">
+                    <a:lnL w="12700" cap="flat" cmpd="sng" algn="ctr">
+                      <a:solidFill>
+                        <a:srgbClr val="C0CC2D"/>
+                      </a:solidFill>
+                      <a:prstDash val="solid"/>
+                      <a:round/>
+                      <a:headEnd type="none" w="med" len="med"/>
+                      <a:tailEnd type="none" w="med" len="med"/>
+                    </a:lnL>
+                    <a:lnR w="12700" cap="flat" cmpd="sng" algn="ctr">
+                      <a:solidFill>
+                        <a:srgbClr val="00CC2D"/>
+                      </a:solidFill>
+                      <a:prstDash val="solid"/>
+                      <a:round/>
+                      <a:headEnd type="none" w="med" len="med"/>
+                      <a:tailEnd type="none" w="med" len="med"/>
+                    </a:lnR>
+                    <a:lnT w="12700" cap="flat" cmpd="sng" algn="ctr">
+                      <a:solidFill>
+                        <a:srgbClr val="C0CC2D"/>
+                      </a:solidFill>
+                      <a:prstDash val="solid"/>
+                      <a:round/>
+                      <a:headEnd type="none" w="med" len="med"/>
+                      <a:tailEnd type="none" w="med" len="med"/>
+                    </a:lnT>
+                    <a:lnB w="12700" cap="flat" cmpd="sng" algn="ctr">
+                      <a:solidFill>
+                        <a:srgbClr val="00CC2D"/>
+                      </a:solidFill>
+                      <a:prstDash val="solid"/>
+                      <a:round/>
+                      <a:headEnd type="none" w="med" len="med"/>
+                      <a:tailEnd type="none" w="med" len="med"/>
+                    </a:lnB>
+                  </a:tcPr>
+                </a:tc>
+                <a:tc>
+                  <a:txBody>
+                    <a:bodyPr/>
+                    <a:lstStyle/>
+                    <a:p>
+                      <a:pPr algn="l"/>
+                      <a:r>
+                        <a:rPr lang="en-IN" b="1">
+                          <a:effectLst/>
+                          <a:hlinkClick r:id="rId4"/>
+                        </a:rPr>
+                        <a:t>Integration Tests</a:t>
+                      </a:r>
+                      <a:endParaRPr lang="en-IN" b="0">
+                        <a:effectLst/>
+                      </a:endParaRPr>
+                    </a:p>
+                  </a:txBody>
+                  <a:tcPr anchor="ctr">
+                    <a:lnL w="12700" cap="flat" cmpd="sng" algn="ctr">
+                      <a:solidFill>
+                        <a:srgbClr val="00CC2D"/>
+                      </a:solidFill>
+                      <a:prstDash val="solid"/>
+                      <a:round/>
+                      <a:headEnd type="none" w="med" len="med"/>
+                      <a:tailEnd type="none" w="med" len="med"/>
+                    </a:lnL>
+                    <a:lnR w="12700" cap="flat" cmpd="sng" algn="ctr">
+                      <a:solidFill>
+                        <a:srgbClr val="00CC2D"/>
+                      </a:solidFill>
+                      <a:prstDash val="solid"/>
+                      <a:round/>
+                      <a:headEnd type="none" w="med" len="med"/>
+                      <a:tailEnd type="none" w="med" len="med"/>
+                    </a:lnR>
+                    <a:lnT w="12700" cap="flat" cmpd="sng" algn="ctr">
+                      <a:solidFill>
+                        <a:srgbClr val="00CC2D"/>
+                      </a:solidFill>
+                      <a:prstDash val="solid"/>
+                      <a:round/>
+                      <a:headEnd type="none" w="med" len="med"/>
+                      <a:tailEnd type="none" w="med" len="med"/>
+                    </a:lnT>
+                    <a:lnB w="12700" cap="flat" cmpd="sng" algn="ctr">
+                      <a:solidFill>
+                        <a:srgbClr val="20CD2D"/>
+                      </a:solidFill>
+                      <a:prstDash val="solid"/>
+                      <a:round/>
+                      <a:headEnd type="none" w="med" len="med"/>
+                      <a:tailEnd type="none" w="med" len="med"/>
+                    </a:lnB>
+                  </a:tcPr>
+                </a:tc>
+                <a:extLst>
+                  <a:ext uri="{0D108BD9-81ED-4DB2-BD59-A6C34878D82A}">
+                    <a16:rowId xmlns:a16="http://schemas.microsoft.com/office/drawing/2014/main" val="683029484"/>
+                  </a:ext>
+                </a:extLst>
+              </a:tr>
+              <a:tr h="0">
+                <a:tc>
+                  <a:txBody>
+                    <a:bodyPr/>
+                    <a:lstStyle/>
+                    <a:p>
+                      <a:r>
+                        <a:rPr lang="en-IN" dirty="0">
+                          <a:effectLst/>
+                        </a:rPr>
+                        <a:t>Provision real infrastructure</a:t>
+                      </a:r>
+                    </a:p>
+                  </a:txBody>
+                  <a:tcPr anchor="ctr">
+                    <a:lnL w="12700" cap="flat" cmpd="sng" algn="ctr">
+                      <a:solidFill>
+                        <a:srgbClr val="60CC2D"/>
+                      </a:solidFill>
+                      <a:prstDash val="solid"/>
+                      <a:round/>
+                      <a:headEnd type="none" w="med" len="med"/>
+                      <a:tailEnd type="none" w="med" len="med"/>
+                    </a:lnL>
+                    <a:lnR w="12700" cap="flat" cmpd="sng" algn="ctr">
+                      <a:solidFill>
+                        <a:srgbClr val="80CD2D"/>
+                      </a:solidFill>
+                      <a:prstDash val="solid"/>
+                      <a:round/>
+                      <a:headEnd type="none" w="med" len="med"/>
+                      <a:tailEnd type="none" w="med" len="med"/>
+                    </a:lnR>
+                    <a:lnT w="12700" cap="flat" cmpd="sng" algn="ctr">
+                      <a:solidFill>
+                        <a:srgbClr val="60CC2D"/>
+                      </a:solidFill>
+                      <a:prstDash val="solid"/>
+                      <a:round/>
+                      <a:headEnd type="none" w="med" len="med"/>
+                      <a:tailEnd type="none" w="med" len="med"/>
+                    </a:lnT>
+                    <a:lnB w="12700" cap="flat" cmpd="sng" algn="ctr">
+                      <a:solidFill>
+                        <a:srgbClr val="C0CC2D"/>
+                      </a:solidFill>
+                      <a:prstDash val="solid"/>
+                      <a:round/>
+                      <a:headEnd type="none" w="med" len="med"/>
+                      <a:tailEnd type="none" w="med" len="med"/>
+                    </a:lnB>
+                  </a:tcPr>
+                </a:tc>
+                <a:tc>
+                  <a:txBody>
+                    <a:bodyPr/>
+                    <a:lstStyle/>
+                    <a:p>
+                      <a:r>
+                        <a:rPr lang="en-IN">
+                          <a:effectLst/>
+                        </a:rPr>
+                        <a:t>No</a:t>
+                      </a:r>
+                    </a:p>
+                  </a:txBody>
+                  <a:tcPr anchor="ctr">
+                    <a:lnL w="12700" cap="flat" cmpd="sng" algn="ctr">
+                      <a:solidFill>
+                        <a:srgbClr val="80CD2D"/>
+                      </a:solidFill>
+                      <a:prstDash val="solid"/>
+                      <a:round/>
+                      <a:headEnd type="none" w="med" len="med"/>
+                      <a:tailEnd type="none" w="med" len="med"/>
+                    </a:lnL>
+                    <a:lnR w="12700" cap="flat" cmpd="sng" algn="ctr">
+                      <a:solidFill>
+                        <a:srgbClr val="00CC2D"/>
+                      </a:solidFill>
+                      <a:prstDash val="solid"/>
+                      <a:round/>
+                      <a:headEnd type="none" w="med" len="med"/>
+                      <a:tailEnd type="none" w="med" len="med"/>
+                    </a:lnR>
+                    <a:lnT w="12700" cap="flat" cmpd="sng" algn="ctr">
+                      <a:solidFill>
+                        <a:srgbClr val="80CD2D"/>
+                      </a:solidFill>
+                      <a:prstDash val="solid"/>
+                      <a:round/>
+                      <a:headEnd type="none" w="med" len="med"/>
+                      <a:tailEnd type="none" w="med" len="med"/>
+                    </a:lnT>
+                    <a:lnB w="12700" cap="flat" cmpd="sng" algn="ctr">
+                      <a:solidFill>
+                        <a:srgbClr val="A0CB2D"/>
+                      </a:solidFill>
+                      <a:prstDash val="solid"/>
+                      <a:round/>
+                      <a:headEnd type="none" w="med" len="med"/>
+                      <a:tailEnd type="none" w="med" len="med"/>
+                    </a:lnB>
+                  </a:tcPr>
+                </a:tc>
+                <a:tc>
+                  <a:txBody>
+                    <a:bodyPr/>
+                    <a:lstStyle/>
+                    <a:p>
+                      <a:r>
+                        <a:rPr lang="en-IN">
+                          <a:effectLst/>
+                        </a:rPr>
+                        <a:t>Yes</a:t>
+                      </a:r>
+                    </a:p>
+                  </a:txBody>
+                  <a:tcPr anchor="ctr">
+                    <a:lnL w="12700" cap="flat" cmpd="sng" algn="ctr">
+                      <a:solidFill>
+                        <a:srgbClr val="00CC2D"/>
+                      </a:solidFill>
+                      <a:prstDash val="solid"/>
+                      <a:round/>
+                      <a:headEnd type="none" w="med" len="med"/>
+                      <a:tailEnd type="none" w="med" len="med"/>
+                    </a:lnL>
+                    <a:lnR w="12700" cap="flat" cmpd="sng" algn="ctr">
+                      <a:solidFill>
+                        <a:srgbClr val="20CD2D"/>
+                      </a:solidFill>
+                      <a:prstDash val="solid"/>
+                      <a:round/>
+                      <a:headEnd type="none" w="med" len="med"/>
+                      <a:tailEnd type="none" w="med" len="med"/>
+                    </a:lnR>
+                    <a:lnT w="12700" cap="flat" cmpd="sng" algn="ctr">
+                      <a:solidFill>
+                        <a:srgbClr val="00CC2D"/>
+                      </a:solidFill>
+                      <a:prstDash val="solid"/>
+                      <a:round/>
+                      <a:headEnd type="none" w="med" len="med"/>
+                      <a:tailEnd type="none" w="med" len="med"/>
+                    </a:lnT>
+                    <a:lnB w="12700" cap="flat" cmpd="sng" algn="ctr">
+                      <a:solidFill>
+                        <a:srgbClr val="C0CC2D"/>
+                      </a:solidFill>
+                      <a:prstDash val="solid"/>
+                      <a:round/>
+                      <a:headEnd type="none" w="med" len="med"/>
+                      <a:tailEnd type="none" w="med" len="med"/>
+                    </a:lnB>
+                  </a:tcPr>
+                </a:tc>
+                <a:tc>
+                  <a:txBody>
+                    <a:bodyPr/>
+                    <a:lstStyle/>
+                    <a:p>
+                      <a:r>
+                        <a:rPr lang="en-IN">
+                          <a:effectLst/>
+                        </a:rPr>
+                        <a:t>Yes</a:t>
+                      </a:r>
+                    </a:p>
+                  </a:txBody>
+                  <a:tcPr anchor="ctr">
+                    <a:lnL w="12700" cap="flat" cmpd="sng" algn="ctr">
+                      <a:solidFill>
+                        <a:srgbClr val="20CD2D"/>
+                      </a:solidFill>
+                      <a:prstDash val="solid"/>
+                      <a:round/>
+                      <a:headEnd type="none" w="med" len="med"/>
+                      <a:tailEnd type="none" w="med" len="med"/>
+                    </a:lnL>
+                    <a:lnR w="12700" cap="flat" cmpd="sng" algn="ctr">
+                      <a:solidFill>
+                        <a:srgbClr val="20CD2D"/>
+                      </a:solidFill>
+                      <a:prstDash val="solid"/>
+                      <a:round/>
+                      <a:headEnd type="none" w="med" len="med"/>
+                      <a:tailEnd type="none" w="med" len="med"/>
+                    </a:lnR>
+                    <a:lnT w="12700" cap="flat" cmpd="sng" algn="ctr">
+                      <a:solidFill>
+                        <a:srgbClr val="20CD2D"/>
+                      </a:solidFill>
+                      <a:prstDash val="solid"/>
+                      <a:round/>
+                      <a:headEnd type="none" w="med" len="med"/>
+                      <a:tailEnd type="none" w="med" len="med"/>
+                    </a:lnT>
+                    <a:lnB w="12700" cap="flat" cmpd="sng" algn="ctr">
+                      <a:solidFill>
+                        <a:srgbClr val="E0CD2D"/>
+                      </a:solidFill>
+                      <a:prstDash val="solid"/>
+                      <a:round/>
+                      <a:headEnd type="none" w="med" len="med"/>
+                      <a:tailEnd type="none" w="med" len="med"/>
+                    </a:lnB>
+                  </a:tcPr>
+                </a:tc>
+                <a:extLst>
+                  <a:ext uri="{0D108BD9-81ED-4DB2-BD59-A6C34878D82A}">
+                    <a16:rowId xmlns:a16="http://schemas.microsoft.com/office/drawing/2014/main" val="893346128"/>
+                  </a:ext>
+                </a:extLst>
+              </a:tr>
+              <a:tr h="0">
+                <a:tc>
+                  <a:txBody>
+                    <a:bodyPr/>
+                    <a:lstStyle/>
+                    <a:p>
+                      <a:r>
+                        <a:rPr lang="en-IN" dirty="0">
+                          <a:effectLst/>
+                        </a:rPr>
+                        <a:t>Require the Pulumi CLI</a:t>
+                      </a:r>
+                    </a:p>
+                  </a:txBody>
+                  <a:tcPr anchor="ctr">
+                    <a:lnL w="12700" cap="flat" cmpd="sng" algn="ctr">
+                      <a:solidFill>
+                        <a:srgbClr val="C0CC2D"/>
+                      </a:solidFill>
+                      <a:prstDash val="solid"/>
+                      <a:round/>
+                      <a:headEnd type="none" w="med" len="med"/>
+                      <a:tailEnd type="none" w="med" len="med"/>
+                    </a:lnL>
+                    <a:lnR w="12700" cap="flat" cmpd="sng" algn="ctr">
+                      <a:solidFill>
+                        <a:srgbClr val="A0CB2D"/>
+                      </a:solidFill>
+                      <a:prstDash val="solid"/>
+                      <a:round/>
+                      <a:headEnd type="none" w="med" len="med"/>
+                      <a:tailEnd type="none" w="med" len="med"/>
+                    </a:lnR>
+                    <a:lnT w="12700" cap="flat" cmpd="sng" algn="ctr">
+                      <a:solidFill>
+                        <a:srgbClr val="C0CC2D"/>
+                      </a:solidFill>
+                      <a:prstDash val="solid"/>
+                      <a:round/>
+                      <a:headEnd type="none" w="med" len="med"/>
+                      <a:tailEnd type="none" w="med" len="med"/>
+                    </a:lnT>
+                    <a:lnB w="12700" cap="flat" cmpd="sng" algn="ctr">
+                      <a:solidFill>
+                        <a:srgbClr val="80CD2D"/>
+                      </a:solidFill>
+                      <a:prstDash val="solid"/>
+                      <a:round/>
+                      <a:headEnd type="none" w="med" len="med"/>
+                      <a:tailEnd type="none" w="med" len="med"/>
+                    </a:lnB>
+                  </a:tcPr>
+                </a:tc>
+                <a:tc>
+                  <a:txBody>
+                    <a:bodyPr/>
+                    <a:lstStyle/>
+                    <a:p>
+                      <a:r>
+                        <a:rPr lang="en-IN" dirty="0">
+                          <a:effectLst/>
+                        </a:rPr>
+                        <a:t>No</a:t>
+                      </a:r>
+                    </a:p>
+                  </a:txBody>
+                  <a:tcPr anchor="ctr">
+                    <a:lnL w="12700" cap="flat" cmpd="sng" algn="ctr">
+                      <a:solidFill>
+                        <a:srgbClr val="A0CB2D"/>
+                      </a:solidFill>
+                      <a:prstDash val="solid"/>
+                      <a:round/>
+                      <a:headEnd type="none" w="med" len="med"/>
+                      <a:tailEnd type="none" w="med" len="med"/>
+                    </a:lnL>
+                    <a:lnR w="12700" cap="flat" cmpd="sng" algn="ctr">
+                      <a:solidFill>
+                        <a:srgbClr val="C0CC2D"/>
+                      </a:solidFill>
+                      <a:prstDash val="solid"/>
+                      <a:round/>
+                      <a:headEnd type="none" w="med" len="med"/>
+                      <a:tailEnd type="none" w="med" len="med"/>
+                    </a:lnR>
+                    <a:lnT w="12700" cap="flat" cmpd="sng" algn="ctr">
+                      <a:solidFill>
+                        <a:srgbClr val="A0CB2D"/>
+                      </a:solidFill>
+                      <a:prstDash val="solid"/>
+                      <a:round/>
+                      <a:headEnd type="none" w="med" len="med"/>
+                      <a:tailEnd type="none" w="med" len="med"/>
+                    </a:lnT>
+                    <a:lnB w="12700" cap="flat" cmpd="sng" algn="ctr">
+                      <a:solidFill>
+                        <a:srgbClr val="C0CC2D"/>
+                      </a:solidFill>
+                      <a:prstDash val="solid"/>
+                      <a:round/>
+                      <a:headEnd type="none" w="med" len="med"/>
+                      <a:tailEnd type="none" w="med" len="med"/>
+                    </a:lnB>
+                  </a:tcPr>
+                </a:tc>
+                <a:tc>
+                  <a:txBody>
+                    <a:bodyPr/>
+                    <a:lstStyle/>
+                    <a:p>
+                      <a:r>
+                        <a:rPr lang="en-IN">
+                          <a:effectLst/>
+                        </a:rPr>
+                        <a:t>Yes</a:t>
+                      </a:r>
+                    </a:p>
+                  </a:txBody>
+                  <a:tcPr anchor="ctr">
+                    <a:lnL w="12700" cap="flat" cmpd="sng" algn="ctr">
+                      <a:solidFill>
+                        <a:srgbClr val="C0CC2D"/>
+                      </a:solidFill>
+                      <a:prstDash val="solid"/>
+                      <a:round/>
+                      <a:headEnd type="none" w="med" len="med"/>
+                      <a:tailEnd type="none" w="med" len="med"/>
+                    </a:lnL>
+                    <a:lnR w="12700" cap="flat" cmpd="sng" algn="ctr">
+                      <a:solidFill>
+                        <a:srgbClr val="E0CD2D"/>
+                      </a:solidFill>
+                      <a:prstDash val="solid"/>
+                      <a:round/>
+                      <a:headEnd type="none" w="med" len="med"/>
+                      <a:tailEnd type="none" w="med" len="med"/>
+                    </a:lnR>
+                    <a:lnT w="12700" cap="flat" cmpd="sng" algn="ctr">
+                      <a:solidFill>
+                        <a:srgbClr val="C0CC2D"/>
+                      </a:solidFill>
+                      <a:prstDash val="solid"/>
+                      <a:round/>
+                      <a:headEnd type="none" w="med" len="med"/>
+                      <a:tailEnd type="none" w="med" len="med"/>
+                    </a:lnT>
+                    <a:lnB w="12700" cap="flat" cmpd="sng" algn="ctr">
+                      <a:solidFill>
+                        <a:srgbClr val="40CE2D"/>
+                      </a:solidFill>
+                      <a:prstDash val="solid"/>
+                      <a:round/>
+                      <a:headEnd type="none" w="med" len="med"/>
+                      <a:tailEnd type="none" w="med" len="med"/>
+                    </a:lnB>
+                  </a:tcPr>
+                </a:tc>
+                <a:tc>
+                  <a:txBody>
+                    <a:bodyPr/>
+                    <a:lstStyle/>
+                    <a:p>
+                      <a:r>
+                        <a:rPr lang="en-IN">
+                          <a:effectLst/>
+                        </a:rPr>
+                        <a:t>Yes</a:t>
+                      </a:r>
+                    </a:p>
+                  </a:txBody>
+                  <a:tcPr anchor="ctr">
+                    <a:lnL w="12700" cap="flat" cmpd="sng" algn="ctr">
+                      <a:solidFill>
+                        <a:srgbClr val="E0CD2D"/>
+                      </a:solidFill>
+                      <a:prstDash val="solid"/>
+                      <a:round/>
+                      <a:headEnd type="none" w="med" len="med"/>
+                      <a:tailEnd type="none" w="med" len="med"/>
+                    </a:lnL>
+                    <a:lnR w="12700" cap="flat" cmpd="sng" algn="ctr">
+                      <a:solidFill>
+                        <a:srgbClr val="E0CD2D"/>
+                      </a:solidFill>
+                      <a:prstDash val="solid"/>
+                      <a:round/>
+                      <a:headEnd type="none" w="med" len="med"/>
+                      <a:tailEnd type="none" w="med" len="med"/>
+                    </a:lnR>
+                    <a:lnT w="12700" cap="flat" cmpd="sng" algn="ctr">
+                      <a:solidFill>
+                        <a:srgbClr val="E0CD2D"/>
+                      </a:solidFill>
+                      <a:prstDash val="solid"/>
+                      <a:round/>
+                      <a:headEnd type="none" w="med" len="med"/>
+                      <a:tailEnd type="none" w="med" len="med"/>
+                    </a:lnT>
+                    <a:lnB w="12700" cap="flat" cmpd="sng" algn="ctr">
+                      <a:solidFill>
+                        <a:srgbClr val="A0CB2D"/>
+                      </a:solidFill>
+                      <a:prstDash val="solid"/>
+                      <a:round/>
+                      <a:headEnd type="none" w="med" len="med"/>
+                      <a:tailEnd type="none" w="med" len="med"/>
+                    </a:lnB>
+                  </a:tcPr>
+                </a:tc>
+                <a:extLst>
+                  <a:ext uri="{0D108BD9-81ED-4DB2-BD59-A6C34878D82A}">
+                    <a16:rowId xmlns:a16="http://schemas.microsoft.com/office/drawing/2014/main" val="2867973287"/>
+                  </a:ext>
+                </a:extLst>
+              </a:tr>
+              <a:tr h="0">
+                <a:tc>
+                  <a:txBody>
+                    <a:bodyPr/>
+                    <a:lstStyle/>
+                    <a:p>
+                      <a:r>
+                        <a:rPr lang="en-IN" dirty="0">
+                          <a:effectLst/>
+                        </a:rPr>
+                        <a:t>Time to execute</a:t>
+                      </a:r>
+                    </a:p>
+                  </a:txBody>
+                  <a:tcPr anchor="ctr">
+                    <a:lnL w="12700" cap="flat" cmpd="sng" algn="ctr">
+                      <a:solidFill>
+                        <a:srgbClr val="80CD2D"/>
+                      </a:solidFill>
+                      <a:prstDash val="solid"/>
+                      <a:round/>
+                      <a:headEnd type="none" w="med" len="med"/>
+                      <a:tailEnd type="none" w="med" len="med"/>
+                    </a:lnL>
+                    <a:lnR w="12700" cap="flat" cmpd="sng" algn="ctr">
+                      <a:solidFill>
+                        <a:srgbClr val="C0CC2D"/>
+                      </a:solidFill>
+                      <a:prstDash val="solid"/>
+                      <a:round/>
+                      <a:headEnd type="none" w="med" len="med"/>
+                      <a:tailEnd type="none" w="med" len="med"/>
+                    </a:lnR>
+                    <a:lnT w="12700" cap="flat" cmpd="sng" algn="ctr">
+                      <a:solidFill>
+                        <a:srgbClr val="80CD2D"/>
+                      </a:solidFill>
+                      <a:prstDash val="solid"/>
+                      <a:round/>
+                      <a:headEnd type="none" w="med" len="med"/>
+                      <a:tailEnd type="none" w="med" len="med"/>
+                    </a:lnT>
+                    <a:lnB w="12700" cap="flat" cmpd="sng" algn="ctr">
+                      <a:solidFill>
+                        <a:srgbClr val="00CC2D"/>
+                      </a:solidFill>
+                      <a:prstDash val="solid"/>
+                      <a:round/>
+                      <a:headEnd type="none" w="med" len="med"/>
+                      <a:tailEnd type="none" w="med" len="med"/>
+                    </a:lnB>
+                  </a:tcPr>
+                </a:tc>
+                <a:tc>
+                  <a:txBody>
+                    <a:bodyPr/>
+                    <a:lstStyle/>
+                    <a:p>
+                      <a:r>
+                        <a:rPr lang="en-IN" dirty="0">
+                          <a:effectLst/>
+                        </a:rPr>
+                        <a:t>Milliseconds</a:t>
+                      </a:r>
+                    </a:p>
+                  </a:txBody>
+                  <a:tcPr anchor="ctr">
+                    <a:lnL w="12700" cap="flat" cmpd="sng" algn="ctr">
+                      <a:solidFill>
+                        <a:srgbClr val="C0CC2D"/>
+                      </a:solidFill>
+                      <a:prstDash val="solid"/>
+                      <a:round/>
+                      <a:headEnd type="none" w="med" len="med"/>
+                      <a:tailEnd type="none" w="med" len="med"/>
+                    </a:lnL>
+                    <a:lnR w="12700" cap="flat" cmpd="sng" algn="ctr">
+                      <a:solidFill>
+                        <a:srgbClr val="40CE2D"/>
+                      </a:solidFill>
+                      <a:prstDash val="solid"/>
+                      <a:round/>
+                      <a:headEnd type="none" w="med" len="med"/>
+                      <a:tailEnd type="none" w="med" len="med"/>
+                    </a:lnR>
+                    <a:lnT w="12700" cap="flat" cmpd="sng" algn="ctr">
+                      <a:solidFill>
+                        <a:srgbClr val="C0CC2D"/>
+                      </a:solidFill>
+                      <a:prstDash val="solid"/>
+                      <a:round/>
+                      <a:headEnd type="none" w="med" len="med"/>
+                      <a:tailEnd type="none" w="med" len="med"/>
+                    </a:lnT>
+                    <a:lnB w="12700" cap="flat" cmpd="sng" algn="ctr">
+                      <a:solidFill>
+                        <a:srgbClr val="C0CC2D"/>
+                      </a:solidFill>
+                      <a:prstDash val="solid"/>
+                      <a:round/>
+                      <a:headEnd type="none" w="med" len="med"/>
+                      <a:tailEnd type="none" w="med" len="med"/>
+                    </a:lnB>
+                  </a:tcPr>
+                </a:tc>
+                <a:tc>
+                  <a:txBody>
+                    <a:bodyPr/>
+                    <a:lstStyle/>
+                    <a:p>
+                      <a:r>
+                        <a:rPr lang="en-IN" dirty="0">
+                          <a:effectLst/>
+                        </a:rPr>
+                        <a:t>Seconds</a:t>
+                      </a:r>
+                    </a:p>
+                  </a:txBody>
+                  <a:tcPr anchor="ctr">
+                    <a:lnL w="12700" cap="flat" cmpd="sng" algn="ctr">
+                      <a:solidFill>
+                        <a:srgbClr val="40CE2D"/>
+                      </a:solidFill>
+                      <a:prstDash val="solid"/>
+                      <a:round/>
+                      <a:headEnd type="none" w="med" len="med"/>
+                      <a:tailEnd type="none" w="med" len="med"/>
+                    </a:lnL>
+                    <a:lnR w="12700" cap="flat" cmpd="sng" algn="ctr">
+                      <a:solidFill>
+                        <a:srgbClr val="A0CB2D"/>
+                      </a:solidFill>
+                      <a:prstDash val="solid"/>
+                      <a:round/>
+                      <a:headEnd type="none" w="med" len="med"/>
+                      <a:tailEnd type="none" w="med" len="med"/>
+                    </a:lnR>
+                    <a:lnT w="12700" cap="flat" cmpd="sng" algn="ctr">
+                      <a:solidFill>
+                        <a:srgbClr val="40CE2D"/>
+                      </a:solidFill>
+                      <a:prstDash val="solid"/>
+                      <a:round/>
+                      <a:headEnd type="none" w="med" len="med"/>
+                      <a:tailEnd type="none" w="med" len="med"/>
+                    </a:lnT>
+                    <a:lnB w="12700" cap="flat" cmpd="sng" algn="ctr">
+                      <a:solidFill>
+                        <a:srgbClr val="E0CD2D"/>
+                      </a:solidFill>
+                      <a:prstDash val="solid"/>
+                      <a:round/>
+                      <a:headEnd type="none" w="med" len="med"/>
+                      <a:tailEnd type="none" w="med" len="med"/>
+                    </a:lnB>
+                  </a:tcPr>
+                </a:tc>
+                <a:tc>
+                  <a:txBody>
+                    <a:bodyPr/>
+                    <a:lstStyle/>
+                    <a:p>
+                      <a:r>
+                        <a:rPr lang="en-IN">
+                          <a:effectLst/>
+                        </a:rPr>
+                        <a:t>Minutes</a:t>
+                      </a:r>
+                    </a:p>
+                  </a:txBody>
+                  <a:tcPr anchor="ctr">
+                    <a:lnL w="12700" cap="flat" cmpd="sng" algn="ctr">
+                      <a:solidFill>
+                        <a:srgbClr val="A0CB2D"/>
+                      </a:solidFill>
+                      <a:prstDash val="solid"/>
+                      <a:round/>
+                      <a:headEnd type="none" w="med" len="med"/>
+                      <a:tailEnd type="none" w="med" len="med"/>
+                    </a:lnL>
+                    <a:lnR w="12700" cap="flat" cmpd="sng" algn="ctr">
+                      <a:solidFill>
+                        <a:srgbClr val="A0CB2D"/>
+                      </a:solidFill>
+                      <a:prstDash val="solid"/>
+                      <a:round/>
+                      <a:headEnd type="none" w="med" len="med"/>
+                      <a:tailEnd type="none" w="med" len="med"/>
+                    </a:lnR>
+                    <a:lnT w="12700" cap="flat" cmpd="sng" algn="ctr">
+                      <a:solidFill>
+                        <a:srgbClr val="A0CB2D"/>
+                      </a:solidFill>
+                      <a:prstDash val="solid"/>
+                      <a:round/>
+                      <a:headEnd type="none" w="med" len="med"/>
+                      <a:tailEnd type="none" w="med" len="med"/>
+                    </a:lnT>
+                    <a:lnB w="12700" cap="flat" cmpd="sng" algn="ctr">
+                      <a:solidFill>
+                        <a:srgbClr val="A0CE2D"/>
+                      </a:solidFill>
+                      <a:prstDash val="solid"/>
+                      <a:round/>
+                      <a:headEnd type="none" w="med" len="med"/>
+                      <a:tailEnd type="none" w="med" len="med"/>
+                    </a:lnB>
+                  </a:tcPr>
+                </a:tc>
+                <a:extLst>
+                  <a:ext uri="{0D108BD9-81ED-4DB2-BD59-A6C34878D82A}">
+                    <a16:rowId xmlns:a16="http://schemas.microsoft.com/office/drawing/2014/main" val="3533137983"/>
+                  </a:ext>
+                </a:extLst>
+              </a:tr>
+              <a:tr h="0">
+                <a:tc>
+                  <a:txBody>
+                    <a:bodyPr/>
+                    <a:lstStyle/>
+                    <a:p>
+                      <a:r>
+                        <a:rPr lang="en-IN">
+                          <a:effectLst/>
+                        </a:rPr>
+                        <a:t>Language</a:t>
+                      </a:r>
+                    </a:p>
+                  </a:txBody>
+                  <a:tcPr anchor="ctr">
+                    <a:lnL w="12700" cap="flat" cmpd="sng" algn="ctr">
+                      <a:solidFill>
+                        <a:srgbClr val="00CC2D"/>
+                      </a:solidFill>
+                      <a:prstDash val="solid"/>
+                      <a:round/>
+                      <a:headEnd type="none" w="med" len="med"/>
+                      <a:tailEnd type="none" w="med" len="med"/>
+                    </a:lnL>
+                    <a:lnR w="12700" cap="flat" cmpd="sng" algn="ctr">
+                      <a:solidFill>
+                        <a:srgbClr val="C0CC2D"/>
+                      </a:solidFill>
+                      <a:prstDash val="solid"/>
+                      <a:round/>
+                      <a:headEnd type="none" w="med" len="med"/>
+                      <a:tailEnd type="none" w="med" len="med"/>
+                    </a:lnR>
+                    <a:lnT w="12700" cap="flat" cmpd="sng" algn="ctr">
+                      <a:solidFill>
+                        <a:srgbClr val="00CC2D"/>
+                      </a:solidFill>
+                      <a:prstDash val="solid"/>
+                      <a:round/>
+                      <a:headEnd type="none" w="med" len="med"/>
+                      <a:tailEnd type="none" w="med" len="med"/>
+                    </a:lnT>
+                    <a:lnB w="12700" cap="flat" cmpd="sng" algn="ctr">
+                      <a:solidFill>
+                        <a:srgbClr val="20CD2D"/>
+                      </a:solidFill>
+                      <a:prstDash val="solid"/>
+                      <a:round/>
+                      <a:headEnd type="none" w="med" len="med"/>
+                      <a:tailEnd type="none" w="med" len="med"/>
+                    </a:lnB>
+                  </a:tcPr>
+                </a:tc>
+                <a:tc>
+                  <a:txBody>
+                    <a:bodyPr/>
+                    <a:lstStyle/>
+                    <a:p>
+                      <a:r>
+                        <a:rPr lang="en-IN">
+                          <a:effectLst/>
+                        </a:rPr>
+                        <a:t>Same as Pulumi program</a:t>
+                      </a:r>
+                    </a:p>
+                  </a:txBody>
+                  <a:tcPr anchor="ctr">
+                    <a:lnL w="12700" cap="flat" cmpd="sng" algn="ctr">
+                      <a:solidFill>
+                        <a:srgbClr val="C0CC2D"/>
+                      </a:solidFill>
+                      <a:prstDash val="solid"/>
+                      <a:round/>
+                      <a:headEnd type="none" w="med" len="med"/>
+                      <a:tailEnd type="none" w="med" len="med"/>
+                    </a:lnL>
+                    <a:lnR w="12700" cap="flat" cmpd="sng" algn="ctr">
+                      <a:solidFill>
+                        <a:srgbClr val="E0CD2D"/>
+                      </a:solidFill>
+                      <a:prstDash val="solid"/>
+                      <a:round/>
+                      <a:headEnd type="none" w="med" len="med"/>
+                      <a:tailEnd type="none" w="med" len="med"/>
+                    </a:lnR>
+                    <a:lnT w="12700" cap="flat" cmpd="sng" algn="ctr">
+                      <a:solidFill>
+                        <a:srgbClr val="C0CC2D"/>
+                      </a:solidFill>
+                      <a:prstDash val="solid"/>
+                      <a:round/>
+                      <a:headEnd type="none" w="med" len="med"/>
+                      <a:tailEnd type="none" w="med" len="med"/>
+                    </a:lnT>
+                    <a:lnB w="12700" cap="flat" cmpd="sng" algn="ctr">
+                      <a:solidFill>
+                        <a:srgbClr val="20CD2D"/>
+                      </a:solidFill>
+                      <a:prstDash val="solid"/>
+                      <a:round/>
+                      <a:headEnd type="none" w="med" len="med"/>
+                      <a:tailEnd type="none" w="med" len="med"/>
+                    </a:lnB>
+                  </a:tcPr>
+                </a:tc>
+                <a:tc>
+                  <a:txBody>
+                    <a:bodyPr/>
+                    <a:lstStyle/>
+                    <a:p>
+                      <a:r>
+                        <a:rPr lang="en-IN">
+                          <a:effectLst/>
+                        </a:rPr>
+                        <a:t>Node.js or Python</a:t>
+                      </a:r>
+                    </a:p>
+                  </a:txBody>
+                  <a:tcPr anchor="ctr">
+                    <a:lnL w="12700" cap="flat" cmpd="sng" algn="ctr">
+                      <a:solidFill>
+                        <a:srgbClr val="E0CD2D"/>
+                      </a:solidFill>
+                      <a:prstDash val="solid"/>
+                      <a:round/>
+                      <a:headEnd type="none" w="med" len="med"/>
+                      <a:tailEnd type="none" w="med" len="med"/>
+                    </a:lnL>
+                    <a:lnR w="12700" cap="flat" cmpd="sng" algn="ctr">
+                      <a:solidFill>
+                        <a:srgbClr val="A0CE2D"/>
+                      </a:solidFill>
+                      <a:prstDash val="solid"/>
+                      <a:round/>
+                      <a:headEnd type="none" w="med" len="med"/>
+                      <a:tailEnd type="none" w="med" len="med"/>
+                    </a:lnR>
+                    <a:lnT w="12700" cap="flat" cmpd="sng" algn="ctr">
+                      <a:solidFill>
+                        <a:srgbClr val="E0CD2D"/>
+                      </a:solidFill>
+                      <a:prstDash val="solid"/>
+                      <a:round/>
+                      <a:headEnd type="none" w="med" len="med"/>
+                      <a:tailEnd type="none" w="med" len="med"/>
+                    </a:lnT>
+                    <a:lnB w="12700" cap="flat" cmpd="sng" algn="ctr">
+                      <a:solidFill>
+                        <a:srgbClr val="C0CC2D"/>
+                      </a:solidFill>
+                      <a:prstDash val="solid"/>
+                      <a:round/>
+                      <a:headEnd type="none" w="med" len="med"/>
+                      <a:tailEnd type="none" w="med" len="med"/>
+                    </a:lnB>
+                  </a:tcPr>
+                </a:tc>
+                <a:tc>
+                  <a:txBody>
+                    <a:bodyPr/>
+                    <a:lstStyle/>
+                    <a:p>
+                      <a:r>
+                        <a:rPr lang="en-IN">
+                          <a:effectLst/>
+                        </a:rPr>
+                        <a:t>Any language</a:t>
+                      </a:r>
+                    </a:p>
+                  </a:txBody>
+                  <a:tcPr anchor="ctr">
+                    <a:lnL w="12700" cap="flat" cmpd="sng" algn="ctr">
+                      <a:solidFill>
+                        <a:srgbClr val="A0CE2D"/>
+                      </a:solidFill>
+                      <a:prstDash val="solid"/>
+                      <a:round/>
+                      <a:headEnd type="none" w="med" len="med"/>
+                      <a:tailEnd type="none" w="med" len="med"/>
+                    </a:lnL>
+                    <a:lnR w="12700" cap="flat" cmpd="sng" algn="ctr">
+                      <a:solidFill>
+                        <a:srgbClr val="A0CE2D"/>
+                      </a:solidFill>
+                      <a:prstDash val="solid"/>
+                      <a:round/>
+                      <a:headEnd type="none" w="med" len="med"/>
+                      <a:tailEnd type="none" w="med" len="med"/>
+                    </a:lnR>
+                    <a:lnT w="12700" cap="flat" cmpd="sng" algn="ctr">
+                      <a:solidFill>
+                        <a:srgbClr val="A0CE2D"/>
+                      </a:solidFill>
+                      <a:prstDash val="solid"/>
+                      <a:round/>
+                      <a:headEnd type="none" w="med" len="med"/>
+                      <a:tailEnd type="none" w="med" len="med"/>
+                    </a:lnT>
+                    <a:lnB w="12700" cap="flat" cmpd="sng" algn="ctr">
+                      <a:solidFill>
+                        <a:srgbClr val="60CC2D"/>
+                      </a:solidFill>
+                      <a:prstDash val="solid"/>
+                      <a:round/>
+                      <a:headEnd type="none" w="med" len="med"/>
+                      <a:tailEnd type="none" w="med" len="med"/>
+                    </a:lnB>
+                  </a:tcPr>
+                </a:tc>
+                <a:extLst>
+                  <a:ext uri="{0D108BD9-81ED-4DB2-BD59-A6C34878D82A}">
+                    <a16:rowId xmlns:a16="http://schemas.microsoft.com/office/drawing/2014/main" val="1193574223"/>
+                  </a:ext>
+                </a:extLst>
+              </a:tr>
+              <a:tr h="0">
+                <a:tc>
+                  <a:txBody>
+                    <a:bodyPr/>
+                    <a:lstStyle/>
+                    <a:p>
+                      <a:r>
+                        <a:rPr lang="en-IN">
+                          <a:effectLst/>
+                        </a:rPr>
+                        <a:t>Validation target</a:t>
+                      </a:r>
+                    </a:p>
+                  </a:txBody>
+                  <a:tcPr anchor="ctr">
+                    <a:lnL w="12700" cap="flat" cmpd="sng" algn="ctr">
+                      <a:solidFill>
+                        <a:srgbClr val="20CD2D"/>
+                      </a:solidFill>
+                      <a:prstDash val="solid"/>
+                      <a:round/>
+                      <a:headEnd type="none" w="med" len="med"/>
+                      <a:tailEnd type="none" w="med" len="med"/>
+                    </a:lnL>
+                    <a:lnR w="12700" cap="flat" cmpd="sng" algn="ctr">
+                      <a:solidFill>
+                        <a:srgbClr val="20CD2D"/>
+                      </a:solidFill>
+                      <a:prstDash val="solid"/>
+                      <a:round/>
+                      <a:headEnd type="none" w="med" len="med"/>
+                      <a:tailEnd type="none" w="med" len="med"/>
+                    </a:lnR>
+                    <a:lnT w="12700" cap="flat" cmpd="sng" algn="ctr">
+                      <a:solidFill>
+                        <a:srgbClr val="20CD2D"/>
+                      </a:solidFill>
+                      <a:prstDash val="solid"/>
+                      <a:round/>
+                      <a:headEnd type="none" w="med" len="med"/>
+                      <a:tailEnd type="none" w="med" len="med"/>
+                    </a:lnT>
+                    <a:lnB w="12700" cap="flat" cmpd="sng" algn="ctr">
+                      <a:solidFill>
+                        <a:srgbClr val="20CD2D"/>
+                      </a:solidFill>
+                      <a:prstDash val="solid"/>
+                      <a:round/>
+                      <a:headEnd type="none" w="med" len="med"/>
+                      <a:tailEnd type="none" w="med" len="med"/>
+                    </a:lnB>
+                  </a:tcPr>
+                </a:tc>
+                <a:tc>
+                  <a:txBody>
+                    <a:bodyPr/>
+                    <a:lstStyle/>
+                    <a:p>
+                      <a:r>
+                        <a:rPr lang="en-IN">
+                          <a:effectLst/>
+                        </a:rPr>
+                        <a:t>Resource inputs</a:t>
+                      </a:r>
+                    </a:p>
+                  </a:txBody>
+                  <a:tcPr anchor="ctr">
+                    <a:lnL w="12700" cap="flat" cmpd="sng" algn="ctr">
+                      <a:solidFill>
+                        <a:srgbClr val="20CD2D"/>
+                      </a:solidFill>
+                      <a:prstDash val="solid"/>
+                      <a:round/>
+                      <a:headEnd type="none" w="med" len="med"/>
+                      <a:tailEnd type="none" w="med" len="med"/>
+                    </a:lnL>
+                    <a:lnR w="12700" cap="flat" cmpd="sng" algn="ctr">
+                      <a:solidFill>
+                        <a:srgbClr val="C0CC2D"/>
+                      </a:solidFill>
+                      <a:prstDash val="solid"/>
+                      <a:round/>
+                      <a:headEnd type="none" w="med" len="med"/>
+                      <a:tailEnd type="none" w="med" len="med"/>
+                    </a:lnR>
+                    <a:lnT w="12700" cap="flat" cmpd="sng" algn="ctr">
+                      <a:solidFill>
+                        <a:srgbClr val="20CD2D"/>
+                      </a:solidFill>
+                      <a:prstDash val="solid"/>
+                      <a:round/>
+                      <a:headEnd type="none" w="med" len="med"/>
+                      <a:tailEnd type="none" w="med" len="med"/>
+                    </a:lnT>
+                    <a:lnB w="12700" cap="flat" cmpd="sng" algn="ctr">
+                      <a:solidFill>
+                        <a:srgbClr val="20CD2D"/>
+                      </a:solidFill>
+                      <a:prstDash val="solid"/>
+                      <a:round/>
+                      <a:headEnd type="none" w="med" len="med"/>
+                      <a:tailEnd type="none" w="med" len="med"/>
+                    </a:lnB>
+                  </a:tcPr>
+                </a:tc>
+                <a:tc>
+                  <a:txBody>
+                    <a:bodyPr/>
+                    <a:lstStyle/>
+                    <a:p>
+                      <a:r>
+                        <a:rPr lang="en-IN">
+                          <a:effectLst/>
+                        </a:rPr>
+                        <a:t>Resource inputs and outputs</a:t>
+                      </a:r>
+                    </a:p>
+                  </a:txBody>
+                  <a:tcPr anchor="ctr">
+                    <a:lnL w="12700" cap="flat" cmpd="sng" algn="ctr">
+                      <a:solidFill>
+                        <a:srgbClr val="C0CC2D"/>
+                      </a:solidFill>
+                      <a:prstDash val="solid"/>
+                      <a:round/>
+                      <a:headEnd type="none" w="med" len="med"/>
+                      <a:tailEnd type="none" w="med" len="med"/>
+                    </a:lnL>
+                    <a:lnR w="12700" cap="flat" cmpd="sng" algn="ctr">
+                      <a:solidFill>
+                        <a:srgbClr val="60CC2D"/>
+                      </a:solidFill>
+                      <a:prstDash val="solid"/>
+                      <a:round/>
+                      <a:headEnd type="none" w="med" len="med"/>
+                      <a:tailEnd type="none" w="med" len="med"/>
+                    </a:lnR>
+                    <a:lnT w="12700" cap="flat" cmpd="sng" algn="ctr">
+                      <a:solidFill>
+                        <a:srgbClr val="C0CC2D"/>
+                      </a:solidFill>
+                      <a:prstDash val="solid"/>
+                      <a:round/>
+                      <a:headEnd type="none" w="med" len="med"/>
+                      <a:tailEnd type="none" w="med" len="med"/>
+                    </a:lnT>
+                    <a:lnB w="12700" cap="flat" cmpd="sng" algn="ctr">
+                      <a:solidFill>
+                        <a:srgbClr val="C0CC2D"/>
+                      </a:solidFill>
+                      <a:prstDash val="solid"/>
+                      <a:round/>
+                      <a:headEnd type="none" w="med" len="med"/>
+                      <a:tailEnd type="none" w="med" len="med"/>
+                    </a:lnB>
+                  </a:tcPr>
+                </a:tc>
+                <a:tc>
+                  <a:txBody>
+                    <a:bodyPr/>
+                    <a:lstStyle/>
+                    <a:p>
+                      <a:r>
+                        <a:rPr lang="en-IN" dirty="0">
+                          <a:effectLst/>
+                        </a:rPr>
+                        <a:t>External endpoints</a:t>
+                      </a:r>
+                    </a:p>
+                  </a:txBody>
+                  <a:tcPr anchor="ctr">
+                    <a:lnL w="12700" cap="flat" cmpd="sng" algn="ctr">
+                      <a:solidFill>
+                        <a:srgbClr val="60CC2D"/>
+                      </a:solidFill>
+                      <a:prstDash val="solid"/>
+                      <a:round/>
+                      <a:headEnd type="none" w="med" len="med"/>
+                      <a:tailEnd type="none" w="med" len="med"/>
+                    </a:lnL>
+                    <a:lnR w="12700" cap="flat" cmpd="sng" algn="ctr">
+                      <a:solidFill>
+                        <a:srgbClr val="60CC2D"/>
+                      </a:solidFill>
+                      <a:prstDash val="solid"/>
+                      <a:round/>
+                      <a:headEnd type="none" w="med" len="med"/>
+                      <a:tailEnd type="none" w="med" len="med"/>
+                    </a:lnR>
+                    <a:lnT w="12700" cap="flat" cmpd="sng" algn="ctr">
+                      <a:solidFill>
+                        <a:srgbClr val="60CC2D"/>
+                      </a:solidFill>
+                      <a:prstDash val="solid"/>
+                      <a:round/>
+                      <a:headEnd type="none" w="med" len="med"/>
+                      <a:tailEnd type="none" w="med" len="med"/>
+                    </a:lnT>
+                    <a:lnB w="12700" cap="flat" cmpd="sng" algn="ctr">
+                      <a:solidFill>
+                        <a:srgbClr val="60CC2D"/>
+                      </a:solidFill>
+                      <a:prstDash val="solid"/>
+                      <a:round/>
+                      <a:headEnd type="none" w="med" len="med"/>
+                      <a:tailEnd type="none" w="med" len="med"/>
+                    </a:lnB>
+                  </a:tcPr>
+                </a:tc>
+                <a:extLst>
+                  <a:ext uri="{0D108BD9-81ED-4DB2-BD59-A6C34878D82A}">
+                    <a16:rowId xmlns:a16="http://schemas.microsoft.com/office/drawing/2014/main" val="2595290197"/>
+                  </a:ext>
+                </a:extLst>
+              </a:tr>
+            </a:tbl>
+          </a:graphicData>
+        </a:graphic>
+      </p:graphicFrame>
+      <p:sp>
+        <p:nvSpPr>
+          <p:cNvPr id="7" name="TextBox 6">
+            <a:extLst>
+              <a:ext uri="{FF2B5EF4-FFF2-40B4-BE49-F238E27FC236}">
+                <a16:creationId xmlns:a16="http://schemas.microsoft.com/office/drawing/2014/main" id="{C2735102-CD0C-CFDB-269C-2AB57214F78B}"/>
+              </a:ext>
+            </a:extLst>
+          </p:cNvPr>
+          <p:cNvSpPr txBox="1"/>
+          <p:nvPr/>
         </p:nvSpPr>
-        <p:spPr/>
+        <p:spPr>
+          <a:xfrm>
+            <a:off x="532647" y="1730440"/>
+            <a:ext cx="11297991" cy="1631216"/>
+          </a:xfrm>
+          <a:prstGeom prst="rect">
+            <a:avLst/>
+          </a:prstGeom>
+          <a:noFill/>
+        </p:spPr>
         <p:txBody>
-          <a:bodyPr/>
+          <a:bodyPr wrap="square">
+            <a:spAutoFit/>
+          </a:bodyPr>
           <a:lstStyle/>
           <a:p>
-            <a:r>
-              <a:rPr lang="en-IN" dirty="0"/>
-              <a:t>Unit Testing</a:t>
-            </a:r>
-          </a:p>
-          <a:p>
-            <a:r>
-              <a:rPr lang="en-IN" dirty="0"/>
-              <a:t>Property Testing</a:t>
-            </a:r>
-          </a:p>
-          <a:p>
-            <a:r>
-              <a:rPr lang="en-IN" dirty="0"/>
-              <a:t>Integration Testing</a:t>
+            <a:pPr marL="0" marR="0" lvl="0" indent="0" algn="l" defTabSz="914400" rtl="0" eaLnBrk="0" fontAlgn="base" latinLnBrk="0" hangingPunct="0">
+              <a:lnSpc>
+                <a:spcPct val="100000"/>
+              </a:lnSpc>
+              <a:spcBef>
+                <a:spcPct val="0"/>
+              </a:spcBef>
+              <a:spcAft>
+                <a:spcPct val="0"/>
+              </a:spcAft>
+              <a:buClrTx/>
+              <a:buSzTx/>
+              <a:buFontTx/>
+              <a:buNone/>
+              <a:tabLst/>
+            </a:pPr>
+            <a:r>
+              <a:rPr lang="en-US" altLang="en-US" sz="2000" dirty="0"/>
+              <a:t>Similarly, </a:t>
+            </a:r>
+            <a:r>
+              <a:rPr lang="en-US" altLang="en-US" sz="2000" dirty="0" err="1"/>
+              <a:t>Pulumi</a:t>
+            </a:r>
+            <a:r>
+              <a:rPr lang="en-US" altLang="en-US" sz="2000" dirty="0"/>
+              <a:t> provides multiple testing styles for cloud programs:</a:t>
+            </a:r>
+          </a:p>
+          <a:p>
+            <a:pPr marL="0" marR="0" lvl="0" indent="0" algn="l" defTabSz="914400" rtl="0" eaLnBrk="0" fontAlgn="base" latinLnBrk="0" hangingPunct="0">
+              <a:lnSpc>
+                <a:spcPct val="100000"/>
+              </a:lnSpc>
+              <a:spcBef>
+                <a:spcPct val="0"/>
+              </a:spcBef>
+              <a:spcAft>
+                <a:spcPct val="0"/>
+              </a:spcAft>
+              <a:buClrTx/>
+              <a:buSzTx/>
+              <a:buFontTx/>
+              <a:buChar char="•"/>
+              <a:tabLst/>
+            </a:pPr>
+            <a:r>
+              <a:rPr lang="en-US" altLang="en-US" sz="2000" b="1" dirty="0"/>
+              <a:t>Unit Tests </a:t>
+            </a:r>
+            <a:r>
+              <a:rPr lang="en-US" altLang="en-US" sz="2000" dirty="0"/>
+              <a:t>are fast in-memory tests that mock all external calls.</a:t>
+            </a:r>
+          </a:p>
+          <a:p>
+            <a:pPr marL="0" marR="0" lvl="0" indent="0" algn="l" defTabSz="914400" rtl="0" eaLnBrk="0" fontAlgn="base" latinLnBrk="0" hangingPunct="0">
+              <a:lnSpc>
+                <a:spcPct val="100000"/>
+              </a:lnSpc>
+              <a:spcBef>
+                <a:spcPct val="0"/>
+              </a:spcBef>
+              <a:spcAft>
+                <a:spcPct val="0"/>
+              </a:spcAft>
+              <a:buClrTx/>
+              <a:buSzTx/>
+              <a:buFontTx/>
+              <a:buChar char="•"/>
+              <a:tabLst/>
+            </a:pPr>
+            <a:r>
+              <a:rPr lang="en-US" altLang="en-US" sz="2000" b="1" dirty="0"/>
+              <a:t>Property Tests </a:t>
+            </a:r>
+            <a:r>
+              <a:rPr lang="en-US" altLang="en-US" sz="2000" dirty="0"/>
+              <a:t>run resource-level assertions while infrastructure is being deployed.</a:t>
+            </a:r>
+          </a:p>
+          <a:p>
+            <a:pPr marL="0" marR="0" lvl="0" indent="0" algn="l" defTabSz="914400" rtl="0" eaLnBrk="0" fontAlgn="base" latinLnBrk="0" hangingPunct="0">
+              <a:lnSpc>
+                <a:spcPct val="100000"/>
+              </a:lnSpc>
+              <a:spcBef>
+                <a:spcPct val="0"/>
+              </a:spcBef>
+              <a:spcAft>
+                <a:spcPct val="0"/>
+              </a:spcAft>
+              <a:buClrTx/>
+              <a:buSzTx/>
+              <a:buFontTx/>
+              <a:buChar char="•"/>
+              <a:tabLst/>
+            </a:pPr>
+            <a:r>
+              <a:rPr lang="en-US" altLang="en-US" sz="2000" b="1" dirty="0"/>
+              <a:t>Integration Tests </a:t>
+            </a:r>
+            <a:r>
+              <a:rPr lang="en-US" altLang="en-US" sz="2000" dirty="0"/>
+              <a:t>deploy ephemeral infrastructure and run external tests against it.</a:t>
+            </a:r>
+          </a:p>
+          <a:p>
+            <a:pPr marL="0" marR="0" lvl="0" indent="0" algn="l" defTabSz="914400" rtl="0" eaLnBrk="0" fontAlgn="base" latinLnBrk="0" hangingPunct="0">
+              <a:lnSpc>
+                <a:spcPct val="100000"/>
+              </a:lnSpc>
+              <a:spcBef>
+                <a:spcPct val="0"/>
+              </a:spcBef>
+              <a:spcAft>
+                <a:spcPct val="0"/>
+              </a:spcAft>
+              <a:buClrTx/>
+              <a:buSzTx/>
+              <a:buFontTx/>
+              <a:buNone/>
+              <a:tabLst/>
+            </a:pPr>
+            <a:r>
+              <a:rPr lang="en-US" altLang="en-US" sz="2000" dirty="0"/>
+              <a:t>The following table summarizes the differences between the three approaches:</a:t>
             </a:r>
           </a:p>
         </p:txBody>
@@ -10922,6 +12407,116 @@
     <p:extLst>
       <p:ext uri="{BB962C8B-B14F-4D97-AF65-F5344CB8AC3E}">
         <p14:creationId xmlns:p14="http://schemas.microsoft.com/office/powerpoint/2010/main" val="3604972052"/>
+      </p:ext>
+    </p:extLst>
+  </p:cSld>
+  <p:clrMapOvr>
+    <a:masterClrMapping/>
+  </p:clrMapOvr>
+</p:sld>
+</file>
+
+<file path=ppt/slides/slide33.xml><?xml version="1.0" encoding="utf-8"?>
+<p:sld xmlns:a="http://schemas.openxmlformats.org/drawingml/2006/main" xmlns:r="http://schemas.openxmlformats.org/officeDocument/2006/relationships" xmlns:p="http://schemas.openxmlformats.org/presentationml/2006/main">
+  <p:cSld>
+    <p:spTree>
+      <p:nvGrpSpPr>
+        <p:cNvPr id="1" name=""/>
+        <p:cNvGrpSpPr/>
+        <p:nvPr/>
+      </p:nvGrpSpPr>
+      <p:grpSpPr>
+        <a:xfrm>
+          <a:off x="0" y="0"/>
+          <a:ext cx="0" cy="0"/>
+          <a:chOff x="0" y="0"/>
+          <a:chExt cx="0" cy="0"/>
+        </a:xfrm>
+      </p:grpSpPr>
+      <p:sp>
+        <p:nvSpPr>
+          <p:cNvPr id="2" name="Title 1">
+            <a:extLst>
+              <a:ext uri="{FF2B5EF4-FFF2-40B4-BE49-F238E27FC236}">
+                <a16:creationId xmlns:a16="http://schemas.microsoft.com/office/drawing/2014/main" id="{58FD577B-FA4B-5D90-73F1-710E398A0964}"/>
+              </a:ext>
+            </a:extLst>
+          </p:cNvPr>
+          <p:cNvSpPr>
+            <a:spLocks noGrp="1"/>
+          </p:cNvSpPr>
+          <p:nvPr>
+            <p:ph type="title"/>
+          </p:nvPr>
+        </p:nvSpPr>
+        <p:spPr/>
+        <p:txBody>
+          <a:bodyPr/>
+          <a:lstStyle/>
+          <a:p>
+            <a:endParaRPr lang="en-IN"/>
+          </a:p>
+        </p:txBody>
+      </p:sp>
+      <p:sp>
+        <p:nvSpPr>
+          <p:cNvPr id="3" name="Content Placeholder 2">
+            <a:extLst>
+              <a:ext uri="{FF2B5EF4-FFF2-40B4-BE49-F238E27FC236}">
+                <a16:creationId xmlns:a16="http://schemas.microsoft.com/office/drawing/2014/main" id="{A7DE54ED-2400-C20E-A9DA-B3134A0D6D94}"/>
+              </a:ext>
+            </a:extLst>
+          </p:cNvPr>
+          <p:cNvSpPr>
+            <a:spLocks noGrp="1"/>
+          </p:cNvSpPr>
+          <p:nvPr>
+            <p:ph idx="1"/>
+          </p:nvPr>
+        </p:nvSpPr>
+        <p:spPr/>
+        <p:txBody>
+          <a:bodyPr/>
+          <a:lstStyle/>
+          <a:p>
+            <a:endParaRPr lang="en-IN"/>
+          </a:p>
+        </p:txBody>
+      </p:sp>
+      <p:pic>
+        <p:nvPicPr>
+          <p:cNvPr id="5" name="Picture 4">
+            <a:extLst>
+              <a:ext uri="{FF2B5EF4-FFF2-40B4-BE49-F238E27FC236}">
+                <a16:creationId xmlns:a16="http://schemas.microsoft.com/office/drawing/2014/main" id="{DF84D67D-EA76-88FF-858D-7CD0A18516D4}"/>
+              </a:ext>
+            </a:extLst>
+          </p:cNvPr>
+          <p:cNvPicPr>
+            <a:picLocks noChangeAspect="1"/>
+          </p:cNvPicPr>
+          <p:nvPr/>
+        </p:nvPicPr>
+        <p:blipFill>
+          <a:blip r:embed="rId2"/>
+          <a:stretch>
+            <a:fillRect/>
+          </a:stretch>
+        </p:blipFill>
+        <p:spPr>
+          <a:xfrm>
+            <a:off x="3018995" y="1218891"/>
+            <a:ext cx="6154009" cy="4420217"/>
+          </a:xfrm>
+          <a:prstGeom prst="rect">
+            <a:avLst/>
+          </a:prstGeom>
+        </p:spPr>
+      </p:pic>
+    </p:spTree>
+    <p:extLst>
+      <p:ext uri="{BB962C8B-B14F-4D97-AF65-F5344CB8AC3E}">
+        <p14:creationId xmlns:p14="http://schemas.microsoft.com/office/powerpoint/2010/main" val="791296467"/>
       </p:ext>
     </p:extLst>
   </p:cSld>

</xml_diff>

<commit_message>
docker pull image works/./
</commit_message>
<xml_diff>
--- a/docs/IaC_Devopedia_Sep_2022.pptx
+++ b/docs/IaC_Devopedia_Sep_2022.pptx
@@ -21,23 +21,24 @@
     <p:sldId id="258" r:id="rId15"/>
     <p:sldId id="277" r:id="rId16"/>
     <p:sldId id="259" r:id="rId17"/>
-    <p:sldId id="278" r:id="rId18"/>
-    <p:sldId id="279" r:id="rId19"/>
-    <p:sldId id="264" r:id="rId20"/>
-    <p:sldId id="280" r:id="rId21"/>
-    <p:sldId id="281" r:id="rId22"/>
-    <p:sldId id="282" r:id="rId23"/>
-    <p:sldId id="283" r:id="rId24"/>
-    <p:sldId id="284" r:id="rId25"/>
-    <p:sldId id="285" r:id="rId26"/>
-    <p:sldId id="286" r:id="rId27"/>
-    <p:sldId id="274" r:id="rId28"/>
-    <p:sldId id="265" r:id="rId29"/>
-    <p:sldId id="273" r:id="rId30"/>
-    <p:sldId id="276" r:id="rId31"/>
-    <p:sldId id="287" r:id="rId32"/>
-    <p:sldId id="288" r:id="rId33"/>
-    <p:sldId id="289" r:id="rId34"/>
+    <p:sldId id="290" r:id="rId18"/>
+    <p:sldId id="278" r:id="rId19"/>
+    <p:sldId id="279" r:id="rId20"/>
+    <p:sldId id="264" r:id="rId21"/>
+    <p:sldId id="280" r:id="rId22"/>
+    <p:sldId id="281" r:id="rId23"/>
+    <p:sldId id="282" r:id="rId24"/>
+    <p:sldId id="283" r:id="rId25"/>
+    <p:sldId id="284" r:id="rId26"/>
+    <p:sldId id="285" r:id="rId27"/>
+    <p:sldId id="286" r:id="rId28"/>
+    <p:sldId id="274" r:id="rId29"/>
+    <p:sldId id="265" r:id="rId30"/>
+    <p:sldId id="273" r:id="rId31"/>
+    <p:sldId id="276" r:id="rId32"/>
+    <p:sldId id="287" r:id="rId33"/>
+    <p:sldId id="288" r:id="rId34"/>
+    <p:sldId id="289" r:id="rId35"/>
   </p:sldIdLst>
   <p:sldSz cx="12192000" cy="6858000"/>
   <p:notesSz cx="6858000" cy="9144000"/>
@@ -3501,7 +3502,7 @@
           <a:p>
             <a:fld id="{4567C160-2C30-4694-9FA0-F603C7AEC858}" type="datetimeFigureOut">
               <a:rPr lang="en-IN" smtClean="0"/>
-              <a:t>22-08-2022</a:t>
+              <a:t>23-08-2022</a:t>
             </a:fld>
             <a:endParaRPr lang="en-IN"/>
           </a:p>
@@ -3680,7 +3681,7 @@
           <a:p>
             <a:fld id="{4567C160-2C30-4694-9FA0-F603C7AEC858}" type="datetimeFigureOut">
               <a:rPr lang="en-IN" smtClean="0"/>
-              <a:t>22-08-2022</a:t>
+              <a:t>23-08-2022</a:t>
             </a:fld>
             <a:endParaRPr lang="en-IN"/>
           </a:p>
@@ -3860,7 +3861,7 @@
           <a:p>
             <a:fld id="{4567C160-2C30-4694-9FA0-F603C7AEC858}" type="datetimeFigureOut">
               <a:rPr lang="en-IN" smtClean="0"/>
-              <a:t>22-08-2022</a:t>
+              <a:t>23-08-2022</a:t>
             </a:fld>
             <a:endParaRPr lang="en-IN"/>
           </a:p>
@@ -4030,7 +4031,7 @@
           <a:p>
             <a:fld id="{4567C160-2C30-4694-9FA0-F603C7AEC858}" type="datetimeFigureOut">
               <a:rPr lang="en-IN" smtClean="0"/>
-              <a:t>22-08-2022</a:t>
+              <a:t>23-08-2022</a:t>
             </a:fld>
             <a:endParaRPr lang="en-IN"/>
           </a:p>
@@ -4343,7 +4344,7 @@
           <a:p>
             <a:fld id="{4567C160-2C30-4694-9FA0-F603C7AEC858}" type="datetimeFigureOut">
               <a:rPr lang="en-IN" smtClean="0"/>
-              <a:t>22-08-2022</a:t>
+              <a:t>23-08-2022</a:t>
             </a:fld>
             <a:endParaRPr lang="en-IN"/>
           </a:p>
@@ -4729,7 +4730,7 @@
           <a:p>
             <a:fld id="{4567C160-2C30-4694-9FA0-F603C7AEC858}" type="datetimeFigureOut">
               <a:rPr lang="en-IN" smtClean="0"/>
-              <a:t>22-08-2022</a:t>
+              <a:t>23-08-2022</a:t>
             </a:fld>
             <a:endParaRPr lang="en-IN"/>
           </a:p>
@@ -5163,7 +5164,7 @@
           <a:p>
             <a:fld id="{4567C160-2C30-4694-9FA0-F603C7AEC858}" type="datetimeFigureOut">
               <a:rPr lang="en-IN" smtClean="0"/>
-              <a:t>22-08-2022</a:t>
+              <a:t>23-08-2022</a:t>
             </a:fld>
             <a:endParaRPr lang="en-IN"/>
           </a:p>
@@ -5281,7 +5282,7 @@
           <a:p>
             <a:fld id="{4567C160-2C30-4694-9FA0-F603C7AEC858}" type="datetimeFigureOut">
               <a:rPr lang="en-IN" smtClean="0"/>
-              <a:t>22-08-2022</a:t>
+              <a:t>23-08-2022</a:t>
             </a:fld>
             <a:endParaRPr lang="en-IN"/>
           </a:p>
@@ -5376,7 +5377,7 @@
           <a:p>
             <a:fld id="{4567C160-2C30-4694-9FA0-F603C7AEC858}" type="datetimeFigureOut">
               <a:rPr lang="en-IN" smtClean="0"/>
-              <a:t>22-08-2022</a:t>
+              <a:t>23-08-2022</a:t>
             </a:fld>
             <a:endParaRPr lang="en-IN"/>
           </a:p>
@@ -5726,7 +5727,7 @@
           <a:p>
             <a:fld id="{4567C160-2C30-4694-9FA0-F603C7AEC858}" type="datetimeFigureOut">
               <a:rPr lang="en-IN" smtClean="0"/>
-              <a:t>22-08-2022</a:t>
+              <a:t>23-08-2022</a:t>
             </a:fld>
             <a:endParaRPr lang="en-IN"/>
           </a:p>
@@ -6151,7 +6152,7 @@
           <a:p>
             <a:fld id="{4567C160-2C30-4694-9FA0-F603C7AEC858}" type="datetimeFigureOut">
               <a:rPr lang="en-IN" smtClean="0"/>
-              <a:t>22-08-2022</a:t>
+              <a:t>23-08-2022</a:t>
             </a:fld>
             <a:endParaRPr lang="en-IN"/>
           </a:p>
@@ -6432,7 +6433,7 @@
           <a:p>
             <a:fld id="{4567C160-2C30-4694-9FA0-F603C7AEC858}" type="datetimeFigureOut">
               <a:rPr lang="en-IN" smtClean="0"/>
-              <a:t>22-08-2022</a:t>
+              <a:t>23-08-2022</a:t>
             </a:fld>
             <a:endParaRPr lang="en-IN"/>
           </a:p>
@@ -8027,6 +8028,89 @@
           <p:cNvPr id="2" name="Title 1">
             <a:extLst>
               <a:ext uri="{FF2B5EF4-FFF2-40B4-BE49-F238E27FC236}">
+                <a16:creationId xmlns:a16="http://schemas.microsoft.com/office/drawing/2014/main" id="{3C15F48A-3FC3-DB44-4132-CB814AA9E715}"/>
+              </a:ext>
+            </a:extLst>
+          </p:cNvPr>
+          <p:cNvSpPr>
+            <a:spLocks noGrp="1"/>
+          </p:cNvSpPr>
+          <p:nvPr>
+            <p:ph type="title"/>
+          </p:nvPr>
+        </p:nvSpPr>
+        <p:spPr/>
+        <p:txBody>
+          <a:bodyPr/>
+          <a:lstStyle/>
+          <a:p>
+            <a:r>
+              <a:rPr lang="en-IN"/>
+              <a:t>PULUMI Service</a:t>
+            </a:r>
+          </a:p>
+        </p:txBody>
+      </p:sp>
+      <p:sp>
+        <p:nvSpPr>
+          <p:cNvPr id="3" name="Content Placeholder 2">
+            <a:extLst>
+              <a:ext uri="{FF2B5EF4-FFF2-40B4-BE49-F238E27FC236}">
+                <a16:creationId xmlns:a16="http://schemas.microsoft.com/office/drawing/2014/main" id="{1B644C8D-F207-DAEC-8627-31A4BAE46EDB}"/>
+              </a:ext>
+            </a:extLst>
+          </p:cNvPr>
+          <p:cNvSpPr>
+            <a:spLocks noGrp="1"/>
+          </p:cNvSpPr>
+          <p:nvPr>
+            <p:ph idx="1"/>
+          </p:nvPr>
+        </p:nvSpPr>
+        <p:spPr/>
+        <p:txBody>
+          <a:bodyPr/>
+          <a:lstStyle/>
+          <a:p>
+            <a:endParaRPr lang="en-IN"/>
+          </a:p>
+        </p:txBody>
+      </p:sp>
+    </p:spTree>
+    <p:extLst>
+      <p:ext uri="{BB962C8B-B14F-4D97-AF65-F5344CB8AC3E}">
+        <p14:creationId xmlns:p14="http://schemas.microsoft.com/office/powerpoint/2010/main" val="3274906734"/>
+      </p:ext>
+    </p:extLst>
+  </p:cSld>
+  <p:clrMapOvr>
+    <a:masterClrMapping/>
+  </p:clrMapOvr>
+</p:sld>
+</file>
+
+<file path=ppt/slides/slide18.xml><?xml version="1.0" encoding="utf-8"?>
+<p:sld xmlns:a="http://schemas.openxmlformats.org/drawingml/2006/main" xmlns:r="http://schemas.openxmlformats.org/officeDocument/2006/relationships" xmlns:p="http://schemas.openxmlformats.org/presentationml/2006/main">
+  <p:cSld>
+    <p:spTree>
+      <p:nvGrpSpPr>
+        <p:cNvPr id="1" name=""/>
+        <p:cNvGrpSpPr/>
+        <p:nvPr/>
+      </p:nvGrpSpPr>
+      <p:grpSpPr>
+        <a:xfrm>
+          <a:off x="0" y="0"/>
+          <a:ext cx="0" cy="0"/>
+          <a:chOff x="0" y="0"/>
+          <a:chExt cx="0" cy="0"/>
+        </a:xfrm>
+      </p:grpSpPr>
+      <p:sp>
+        <p:nvSpPr>
+          <p:cNvPr id="2" name="Title 1">
+            <a:extLst>
+              <a:ext uri="{FF2B5EF4-FFF2-40B4-BE49-F238E27FC236}">
                 <a16:creationId xmlns:a16="http://schemas.microsoft.com/office/drawing/2014/main" id="{02038554-5EAA-3386-E183-0C532D406A0D}"/>
               </a:ext>
             </a:extLst>
@@ -8132,7 +8216,7 @@
 </p:sld>
 </file>
 
-<file path=ppt/slides/slide18.xml><?xml version="1.0" encoding="utf-8"?>
+<file path=ppt/slides/slide19.xml><?xml version="1.0" encoding="utf-8"?>
 <p:sld xmlns:a="http://schemas.openxmlformats.org/drawingml/2006/main" xmlns:r="http://schemas.openxmlformats.org/officeDocument/2006/relationships" xmlns:p="http://schemas.openxmlformats.org/presentationml/2006/main">
   <p:cSld>
     <p:spTree>
@@ -8605,308 +8689,6 @@
 </p:sld>
 </file>
 
-<file path=ppt/slides/slide19.xml><?xml version="1.0" encoding="utf-8"?>
-<p:sld xmlns:a="http://schemas.openxmlformats.org/drawingml/2006/main" xmlns:r="http://schemas.openxmlformats.org/officeDocument/2006/relationships" xmlns:p="http://schemas.openxmlformats.org/presentationml/2006/main">
-  <p:cSld>
-    <p:spTree>
-      <p:nvGrpSpPr>
-        <p:cNvPr id="1" name=""/>
-        <p:cNvGrpSpPr/>
-        <p:nvPr/>
-      </p:nvGrpSpPr>
-      <p:grpSpPr>
-        <a:xfrm>
-          <a:off x="0" y="0"/>
-          <a:ext cx="0" cy="0"/>
-          <a:chOff x="0" y="0"/>
-          <a:chExt cx="0" cy="0"/>
-        </a:xfrm>
-      </p:grpSpPr>
-      <p:sp>
-        <p:nvSpPr>
-          <p:cNvPr id="2" name="Title 1">
-            <a:extLst>
-              <a:ext uri="{FF2B5EF4-FFF2-40B4-BE49-F238E27FC236}">
-                <a16:creationId xmlns:a16="http://schemas.microsoft.com/office/drawing/2014/main" id="{56019E09-BC41-ADDC-4276-954085E88F1F}"/>
-              </a:ext>
-            </a:extLst>
-          </p:cNvPr>
-          <p:cNvSpPr>
-            <a:spLocks noGrp="1"/>
-          </p:cNvSpPr>
-          <p:nvPr>
-            <p:ph type="title"/>
-          </p:nvPr>
-        </p:nvSpPr>
-        <p:spPr/>
-        <p:txBody>
-          <a:bodyPr>
-            <a:normAutofit/>
-          </a:bodyPr>
-          <a:lstStyle/>
-          <a:p>
-            <a:r>
-              <a:rPr lang="en-IN" dirty="0"/>
-              <a:t>State and Backends</a:t>
-            </a:r>
-          </a:p>
-        </p:txBody>
-      </p:sp>
-      <p:sp>
-        <p:nvSpPr>
-          <p:cNvPr id="3" name="Content Placeholder 2">
-            <a:extLst>
-              <a:ext uri="{FF2B5EF4-FFF2-40B4-BE49-F238E27FC236}">
-                <a16:creationId xmlns:a16="http://schemas.microsoft.com/office/drawing/2014/main" id="{BC154606-A147-E571-92FD-395ED9BD77F2}"/>
-              </a:ext>
-            </a:extLst>
-          </p:cNvPr>
-          <p:cNvSpPr>
-            <a:spLocks noGrp="1"/>
-          </p:cNvSpPr>
-          <p:nvPr>
-            <p:ph idx="1"/>
-          </p:nvPr>
-        </p:nvSpPr>
-        <p:spPr/>
-        <p:txBody>
-          <a:bodyPr/>
-          <a:lstStyle/>
-          <a:p>
-            <a:endParaRPr lang="en-IN" dirty="0"/>
-          </a:p>
-        </p:txBody>
-      </p:sp>
-      <p:pic>
-        <p:nvPicPr>
-          <p:cNvPr id="5" name="Picture 4">
-            <a:extLst>
-              <a:ext uri="{FF2B5EF4-FFF2-40B4-BE49-F238E27FC236}">
-                <a16:creationId xmlns:a16="http://schemas.microsoft.com/office/drawing/2014/main" id="{19B9DBA6-E10B-0DCB-0F18-AB1A820194B7}"/>
-              </a:ext>
-            </a:extLst>
-          </p:cNvPr>
-          <p:cNvPicPr>
-            <a:picLocks noChangeAspect="1"/>
-          </p:cNvPicPr>
-          <p:nvPr/>
-        </p:nvPicPr>
-        <p:blipFill>
-          <a:blip r:embed="rId2"/>
-          <a:stretch>
-            <a:fillRect/>
-          </a:stretch>
-        </p:blipFill>
-        <p:spPr>
-          <a:xfrm>
-            <a:off x="1088349" y="2121408"/>
-            <a:ext cx="6917236" cy="4736592"/>
-          </a:xfrm>
-          <a:prstGeom prst="rect">
-            <a:avLst/>
-          </a:prstGeom>
-        </p:spPr>
-      </p:pic>
-      <p:sp>
-        <p:nvSpPr>
-          <p:cNvPr id="7" name="TextBox 6">
-            <a:extLst>
-              <a:ext uri="{FF2B5EF4-FFF2-40B4-BE49-F238E27FC236}">
-                <a16:creationId xmlns:a16="http://schemas.microsoft.com/office/drawing/2014/main" id="{ACAB4833-0CA3-9FBC-0227-88D3266AB838}"/>
-              </a:ext>
-            </a:extLst>
-          </p:cNvPr>
-          <p:cNvSpPr txBox="1"/>
-          <p:nvPr/>
-        </p:nvSpPr>
-        <p:spPr>
-          <a:xfrm>
-            <a:off x="4957585" y="2864244"/>
-            <a:ext cx="6096000" cy="923330"/>
-          </a:xfrm>
-          <a:prstGeom prst="rect">
-            <a:avLst/>
-          </a:prstGeom>
-          <a:noFill/>
-        </p:spPr>
-        <p:txBody>
-          <a:bodyPr wrap="square">
-            <a:spAutoFit/>
-          </a:bodyPr>
-          <a:lstStyle/>
-          <a:p>
-            <a:pPr marL="342900" indent="-342900" algn="l">
-              <a:buFont typeface="+mj-lt"/>
-              <a:buAutoNum type="arabicPeriod"/>
-            </a:pPr>
-            <a:r>
-              <a:rPr lang="en-IN" sz="1800" b="0" i="0" u="none" strike="noStrike" baseline="0" dirty="0" err="1">
-                <a:latin typeface="Helvetica" panose="020B0604020202020204" pitchFamily="34" charset="0"/>
-              </a:rPr>
-              <a:t>app.pulumi.com</a:t>
-            </a:r>
-            <a:endParaRPr lang="en-IN" sz="1800" b="0" i="0" u="none" strike="noStrike" baseline="0" dirty="0">
-              <a:latin typeface="Helvetica" panose="020B0604020202020204" pitchFamily="34" charset="0"/>
-            </a:endParaRPr>
-          </a:p>
-          <a:p>
-            <a:pPr marL="342900" indent="-342900" algn="l">
-              <a:buFont typeface="+mj-lt"/>
-              <a:buAutoNum type="arabicPeriod"/>
-            </a:pPr>
-            <a:r>
-              <a:rPr lang="en-IN" sz="1800" b="0" i="0" u="none" strike="noStrike" baseline="0" dirty="0">
-                <a:latin typeface="Helvetica" panose="020B0604020202020204" pitchFamily="34" charset="0"/>
-              </a:rPr>
-              <a:t>Self-managed backend</a:t>
-            </a:r>
-          </a:p>
-          <a:p>
-            <a:pPr marL="342900" indent="-342900" algn="l">
-              <a:buFont typeface="+mj-lt"/>
-              <a:buAutoNum type="arabicPeriod"/>
-            </a:pPr>
-            <a:r>
-              <a:rPr lang="en-IN" sz="1800" b="0" i="0" u="none" strike="noStrike" baseline="0" dirty="0">
-                <a:latin typeface="Helvetica" panose="020B0604020202020204" pitchFamily="34" charset="0"/>
-              </a:rPr>
-              <a:t>on-premise </a:t>
-            </a:r>
-            <a:r>
-              <a:rPr lang="en-IN" sz="1800" b="0" i="0" u="none" strike="noStrike" baseline="0" dirty="0" err="1">
-                <a:latin typeface="Helvetica" panose="020B0604020202020204" pitchFamily="34" charset="0"/>
-              </a:rPr>
-              <a:t>app.pulumi.com</a:t>
-            </a:r>
-            <a:r>
-              <a:rPr lang="en-IN" sz="1800" b="0" i="0" u="none" strike="noStrike" baseline="0" dirty="0">
-                <a:latin typeface="Helvetica" panose="020B0604020202020204" pitchFamily="34" charset="0"/>
-              </a:rPr>
-              <a:t> (Enterprise version only)</a:t>
-            </a:r>
-            <a:endParaRPr lang="en-IN" dirty="0"/>
-          </a:p>
-        </p:txBody>
-      </p:sp>
-      <p:sp>
-        <p:nvSpPr>
-          <p:cNvPr id="9" name="TextBox 8">
-            <a:extLst>
-              <a:ext uri="{FF2B5EF4-FFF2-40B4-BE49-F238E27FC236}">
-                <a16:creationId xmlns:a16="http://schemas.microsoft.com/office/drawing/2014/main" id="{E0DD04E3-9BDB-3D4F-A615-B5F9BDDC4454}"/>
-              </a:ext>
-            </a:extLst>
-          </p:cNvPr>
-          <p:cNvSpPr txBox="1"/>
-          <p:nvPr/>
-        </p:nvSpPr>
-        <p:spPr>
-          <a:xfrm>
-            <a:off x="8277225" y="5635109"/>
-            <a:ext cx="2447925" cy="369332"/>
-          </a:xfrm>
-          <a:prstGeom prst="rect">
-            <a:avLst/>
-          </a:prstGeom>
-          <a:noFill/>
-        </p:spPr>
-        <p:txBody>
-          <a:bodyPr wrap="square">
-            <a:spAutoFit/>
-          </a:bodyPr>
-          <a:lstStyle/>
-          <a:p>
-            <a:r>
-              <a:rPr lang="en-IN" sz="1800" b="0" i="0" u="none" strike="noStrike" baseline="0" dirty="0">
-                <a:solidFill>
-                  <a:srgbClr val="A30028"/>
-                </a:solidFill>
-                <a:latin typeface="Panton-Regular"/>
-              </a:rPr>
-              <a:t>Resource Providers</a:t>
-            </a:r>
-            <a:endParaRPr lang="en-IN" dirty="0"/>
-          </a:p>
-        </p:txBody>
-      </p:sp>
-      <p:sp>
-        <p:nvSpPr>
-          <p:cNvPr id="6" name="TextBox 5">
-            <a:extLst>
-              <a:ext uri="{FF2B5EF4-FFF2-40B4-BE49-F238E27FC236}">
-                <a16:creationId xmlns:a16="http://schemas.microsoft.com/office/drawing/2014/main" id="{DFE5CEB8-E2BD-2E7B-7630-551EF0E6186F}"/>
-              </a:ext>
-            </a:extLst>
-          </p:cNvPr>
-          <p:cNvSpPr txBox="1"/>
-          <p:nvPr/>
-        </p:nvSpPr>
-        <p:spPr>
-          <a:xfrm>
-            <a:off x="3901440" y="6330434"/>
-            <a:ext cx="6096000" cy="369332"/>
-          </a:xfrm>
-          <a:prstGeom prst="rect">
-            <a:avLst/>
-          </a:prstGeom>
-          <a:noFill/>
-        </p:spPr>
-        <p:txBody>
-          <a:bodyPr wrap="square">
-            <a:spAutoFit/>
-          </a:bodyPr>
-          <a:lstStyle/>
-          <a:p>
-            <a:r>
-              <a:rPr lang="en-IN" dirty="0">
-                <a:hlinkClick r:id="rId3"/>
-              </a:rPr>
-              <a:t>https://</a:t>
-            </a:r>
-            <a:r>
-              <a:rPr lang="en-IN" dirty="0" err="1">
-                <a:hlinkClick r:id="rId3"/>
-              </a:rPr>
-              <a:t>app.pulumi.com</a:t>
-            </a:r>
-            <a:r>
-              <a:rPr lang="en-IN" dirty="0">
-                <a:hlinkClick r:id="rId3"/>
-              </a:rPr>
-              <a:t>/nagkumar/</a:t>
-            </a:r>
-            <a:r>
-              <a:rPr lang="en-IN" dirty="0" err="1">
-                <a:hlinkClick r:id="rId3"/>
-              </a:rPr>
-              <a:t>hw</a:t>
-            </a:r>
-            <a:r>
-              <a:rPr lang="en-IN" dirty="0">
-                <a:hlinkClick r:id="rId3"/>
-              </a:rPr>
-              <a:t>/dev/updates/11</a:t>
-            </a:r>
-            <a:r>
-              <a:rPr lang="en-IN" dirty="0"/>
-              <a:t> </a:t>
-            </a:r>
-          </a:p>
-        </p:txBody>
-      </p:sp>
-    </p:spTree>
-    <p:extLst>
-      <p:ext uri="{BB962C8B-B14F-4D97-AF65-F5344CB8AC3E}">
-        <p14:creationId xmlns:p14="http://schemas.microsoft.com/office/powerpoint/2010/main" val="968428378"/>
-      </p:ext>
-    </p:extLst>
-  </p:cSld>
-  <p:clrMapOvr>
-    <a:masterClrMapping/>
-  </p:clrMapOvr>
-</p:sld>
-</file>
-
 <file path=ppt/slides/slide2.xml><?xml version="1.0" encoding="utf-8"?>
 <p:sld xmlns:a="http://schemas.openxmlformats.org/drawingml/2006/main" xmlns:r="http://schemas.openxmlformats.org/officeDocument/2006/relationships" xmlns:p="http://schemas.openxmlformats.org/presentationml/2006/main">
   <p:cSld>
@@ -9017,6 +8799,308 @@
           <p:cNvPr id="2" name="Title 1">
             <a:extLst>
               <a:ext uri="{FF2B5EF4-FFF2-40B4-BE49-F238E27FC236}">
+                <a16:creationId xmlns:a16="http://schemas.microsoft.com/office/drawing/2014/main" id="{56019E09-BC41-ADDC-4276-954085E88F1F}"/>
+              </a:ext>
+            </a:extLst>
+          </p:cNvPr>
+          <p:cNvSpPr>
+            <a:spLocks noGrp="1"/>
+          </p:cNvSpPr>
+          <p:nvPr>
+            <p:ph type="title"/>
+          </p:nvPr>
+        </p:nvSpPr>
+        <p:spPr/>
+        <p:txBody>
+          <a:bodyPr>
+            <a:normAutofit/>
+          </a:bodyPr>
+          <a:lstStyle/>
+          <a:p>
+            <a:r>
+              <a:rPr lang="en-IN" dirty="0"/>
+              <a:t>State and Backends</a:t>
+            </a:r>
+          </a:p>
+        </p:txBody>
+      </p:sp>
+      <p:sp>
+        <p:nvSpPr>
+          <p:cNvPr id="3" name="Content Placeholder 2">
+            <a:extLst>
+              <a:ext uri="{FF2B5EF4-FFF2-40B4-BE49-F238E27FC236}">
+                <a16:creationId xmlns:a16="http://schemas.microsoft.com/office/drawing/2014/main" id="{BC154606-A147-E571-92FD-395ED9BD77F2}"/>
+              </a:ext>
+            </a:extLst>
+          </p:cNvPr>
+          <p:cNvSpPr>
+            <a:spLocks noGrp="1"/>
+          </p:cNvSpPr>
+          <p:nvPr>
+            <p:ph idx="1"/>
+          </p:nvPr>
+        </p:nvSpPr>
+        <p:spPr/>
+        <p:txBody>
+          <a:bodyPr/>
+          <a:lstStyle/>
+          <a:p>
+            <a:endParaRPr lang="en-IN" dirty="0"/>
+          </a:p>
+        </p:txBody>
+      </p:sp>
+      <p:pic>
+        <p:nvPicPr>
+          <p:cNvPr id="5" name="Picture 4">
+            <a:extLst>
+              <a:ext uri="{FF2B5EF4-FFF2-40B4-BE49-F238E27FC236}">
+                <a16:creationId xmlns:a16="http://schemas.microsoft.com/office/drawing/2014/main" id="{19B9DBA6-E10B-0DCB-0F18-AB1A820194B7}"/>
+              </a:ext>
+            </a:extLst>
+          </p:cNvPr>
+          <p:cNvPicPr>
+            <a:picLocks noChangeAspect="1"/>
+          </p:cNvPicPr>
+          <p:nvPr/>
+        </p:nvPicPr>
+        <p:blipFill>
+          <a:blip r:embed="rId2"/>
+          <a:stretch>
+            <a:fillRect/>
+          </a:stretch>
+        </p:blipFill>
+        <p:spPr>
+          <a:xfrm>
+            <a:off x="1088349" y="2121408"/>
+            <a:ext cx="6917236" cy="4736592"/>
+          </a:xfrm>
+          <a:prstGeom prst="rect">
+            <a:avLst/>
+          </a:prstGeom>
+        </p:spPr>
+      </p:pic>
+      <p:sp>
+        <p:nvSpPr>
+          <p:cNvPr id="7" name="TextBox 6">
+            <a:extLst>
+              <a:ext uri="{FF2B5EF4-FFF2-40B4-BE49-F238E27FC236}">
+                <a16:creationId xmlns:a16="http://schemas.microsoft.com/office/drawing/2014/main" id="{ACAB4833-0CA3-9FBC-0227-88D3266AB838}"/>
+              </a:ext>
+            </a:extLst>
+          </p:cNvPr>
+          <p:cNvSpPr txBox="1"/>
+          <p:nvPr/>
+        </p:nvSpPr>
+        <p:spPr>
+          <a:xfrm>
+            <a:off x="4957585" y="2864244"/>
+            <a:ext cx="6096000" cy="923330"/>
+          </a:xfrm>
+          <a:prstGeom prst="rect">
+            <a:avLst/>
+          </a:prstGeom>
+          <a:noFill/>
+        </p:spPr>
+        <p:txBody>
+          <a:bodyPr wrap="square">
+            <a:spAutoFit/>
+          </a:bodyPr>
+          <a:lstStyle/>
+          <a:p>
+            <a:pPr marL="342900" indent="-342900" algn="l">
+              <a:buFont typeface="+mj-lt"/>
+              <a:buAutoNum type="arabicPeriod"/>
+            </a:pPr>
+            <a:r>
+              <a:rPr lang="en-IN" sz="1800" b="0" i="0" u="none" strike="noStrike" baseline="0" dirty="0" err="1">
+                <a:latin typeface="Helvetica" panose="020B0604020202020204" pitchFamily="34" charset="0"/>
+              </a:rPr>
+              <a:t>app.pulumi.com</a:t>
+            </a:r>
+            <a:endParaRPr lang="en-IN" sz="1800" b="0" i="0" u="none" strike="noStrike" baseline="0" dirty="0">
+              <a:latin typeface="Helvetica" panose="020B0604020202020204" pitchFamily="34" charset="0"/>
+            </a:endParaRPr>
+          </a:p>
+          <a:p>
+            <a:pPr marL="342900" indent="-342900" algn="l">
+              <a:buFont typeface="+mj-lt"/>
+              <a:buAutoNum type="arabicPeriod"/>
+            </a:pPr>
+            <a:r>
+              <a:rPr lang="en-IN" sz="1800" b="0" i="0" u="none" strike="noStrike" baseline="0" dirty="0">
+                <a:latin typeface="Helvetica" panose="020B0604020202020204" pitchFamily="34" charset="0"/>
+              </a:rPr>
+              <a:t>Self-managed backend</a:t>
+            </a:r>
+          </a:p>
+          <a:p>
+            <a:pPr marL="342900" indent="-342900" algn="l">
+              <a:buFont typeface="+mj-lt"/>
+              <a:buAutoNum type="arabicPeriod"/>
+            </a:pPr>
+            <a:r>
+              <a:rPr lang="en-IN" sz="1800" b="0" i="0" u="none" strike="noStrike" baseline="0" dirty="0">
+                <a:latin typeface="Helvetica" panose="020B0604020202020204" pitchFamily="34" charset="0"/>
+              </a:rPr>
+              <a:t>on-premise </a:t>
+            </a:r>
+            <a:r>
+              <a:rPr lang="en-IN" sz="1800" b="0" i="0" u="none" strike="noStrike" baseline="0" dirty="0" err="1">
+                <a:latin typeface="Helvetica" panose="020B0604020202020204" pitchFamily="34" charset="0"/>
+              </a:rPr>
+              <a:t>app.pulumi.com</a:t>
+            </a:r>
+            <a:r>
+              <a:rPr lang="en-IN" sz="1800" b="0" i="0" u="none" strike="noStrike" baseline="0" dirty="0">
+                <a:latin typeface="Helvetica" panose="020B0604020202020204" pitchFamily="34" charset="0"/>
+              </a:rPr>
+              <a:t> (Enterprise version only)</a:t>
+            </a:r>
+            <a:endParaRPr lang="en-IN" dirty="0"/>
+          </a:p>
+        </p:txBody>
+      </p:sp>
+      <p:sp>
+        <p:nvSpPr>
+          <p:cNvPr id="9" name="TextBox 8">
+            <a:extLst>
+              <a:ext uri="{FF2B5EF4-FFF2-40B4-BE49-F238E27FC236}">
+                <a16:creationId xmlns:a16="http://schemas.microsoft.com/office/drawing/2014/main" id="{E0DD04E3-9BDB-3D4F-A615-B5F9BDDC4454}"/>
+              </a:ext>
+            </a:extLst>
+          </p:cNvPr>
+          <p:cNvSpPr txBox="1"/>
+          <p:nvPr/>
+        </p:nvSpPr>
+        <p:spPr>
+          <a:xfrm>
+            <a:off x="8277225" y="5635109"/>
+            <a:ext cx="2447925" cy="369332"/>
+          </a:xfrm>
+          <a:prstGeom prst="rect">
+            <a:avLst/>
+          </a:prstGeom>
+          <a:noFill/>
+        </p:spPr>
+        <p:txBody>
+          <a:bodyPr wrap="square">
+            <a:spAutoFit/>
+          </a:bodyPr>
+          <a:lstStyle/>
+          <a:p>
+            <a:r>
+              <a:rPr lang="en-IN" sz="1800" b="0" i="0" u="none" strike="noStrike" baseline="0" dirty="0">
+                <a:solidFill>
+                  <a:srgbClr val="A30028"/>
+                </a:solidFill>
+                <a:latin typeface="Panton-Regular"/>
+              </a:rPr>
+              <a:t>Resource Providers</a:t>
+            </a:r>
+            <a:endParaRPr lang="en-IN" dirty="0"/>
+          </a:p>
+        </p:txBody>
+      </p:sp>
+      <p:sp>
+        <p:nvSpPr>
+          <p:cNvPr id="6" name="TextBox 5">
+            <a:extLst>
+              <a:ext uri="{FF2B5EF4-FFF2-40B4-BE49-F238E27FC236}">
+                <a16:creationId xmlns:a16="http://schemas.microsoft.com/office/drawing/2014/main" id="{DFE5CEB8-E2BD-2E7B-7630-551EF0E6186F}"/>
+              </a:ext>
+            </a:extLst>
+          </p:cNvPr>
+          <p:cNvSpPr txBox="1"/>
+          <p:nvPr/>
+        </p:nvSpPr>
+        <p:spPr>
+          <a:xfrm>
+            <a:off x="3901440" y="6330434"/>
+            <a:ext cx="6096000" cy="369332"/>
+          </a:xfrm>
+          <a:prstGeom prst="rect">
+            <a:avLst/>
+          </a:prstGeom>
+          <a:noFill/>
+        </p:spPr>
+        <p:txBody>
+          <a:bodyPr wrap="square">
+            <a:spAutoFit/>
+          </a:bodyPr>
+          <a:lstStyle/>
+          <a:p>
+            <a:r>
+              <a:rPr lang="en-IN" dirty="0">
+                <a:hlinkClick r:id="rId3"/>
+              </a:rPr>
+              <a:t>https://</a:t>
+            </a:r>
+            <a:r>
+              <a:rPr lang="en-IN" dirty="0" err="1">
+                <a:hlinkClick r:id="rId3"/>
+              </a:rPr>
+              <a:t>app.pulumi.com</a:t>
+            </a:r>
+            <a:r>
+              <a:rPr lang="en-IN" dirty="0">
+                <a:hlinkClick r:id="rId3"/>
+              </a:rPr>
+              <a:t>/nagkumar/</a:t>
+            </a:r>
+            <a:r>
+              <a:rPr lang="en-IN" dirty="0" err="1">
+                <a:hlinkClick r:id="rId3"/>
+              </a:rPr>
+              <a:t>hw</a:t>
+            </a:r>
+            <a:r>
+              <a:rPr lang="en-IN" dirty="0">
+                <a:hlinkClick r:id="rId3"/>
+              </a:rPr>
+              <a:t>/dev/updates/11</a:t>
+            </a:r>
+            <a:r>
+              <a:rPr lang="en-IN" dirty="0"/>
+              <a:t> </a:t>
+            </a:r>
+          </a:p>
+        </p:txBody>
+      </p:sp>
+    </p:spTree>
+    <p:extLst>
+      <p:ext uri="{BB962C8B-B14F-4D97-AF65-F5344CB8AC3E}">
+        <p14:creationId xmlns:p14="http://schemas.microsoft.com/office/powerpoint/2010/main" val="968428378"/>
+      </p:ext>
+    </p:extLst>
+  </p:cSld>
+  <p:clrMapOvr>
+    <a:masterClrMapping/>
+  </p:clrMapOvr>
+</p:sld>
+</file>
+
+<file path=ppt/slides/slide21.xml><?xml version="1.0" encoding="utf-8"?>
+<p:sld xmlns:a="http://schemas.openxmlformats.org/drawingml/2006/main" xmlns:r="http://schemas.openxmlformats.org/officeDocument/2006/relationships" xmlns:p="http://schemas.openxmlformats.org/presentationml/2006/main">
+  <p:cSld>
+    <p:spTree>
+      <p:nvGrpSpPr>
+        <p:cNvPr id="1" name=""/>
+        <p:cNvGrpSpPr/>
+        <p:nvPr/>
+      </p:nvGrpSpPr>
+      <p:grpSpPr>
+        <a:xfrm>
+          <a:off x="0" y="0"/>
+          <a:ext cx="0" cy="0"/>
+          <a:chOff x="0" y="0"/>
+          <a:chExt cx="0" cy="0"/>
+        </a:xfrm>
+      </p:grpSpPr>
+      <p:sp>
+        <p:nvSpPr>
+          <p:cNvPr id="2" name="Title 1">
+            <a:extLst>
+              <a:ext uri="{FF2B5EF4-FFF2-40B4-BE49-F238E27FC236}">
                 <a16:creationId xmlns:a16="http://schemas.microsoft.com/office/drawing/2014/main" id="{1C72D64C-10BE-A1BC-C390-1D06C12AF2D2}"/>
               </a:ext>
             </a:extLst>
@@ -9085,7 +9169,7 @@
 </p:sld>
 </file>
 
-<file path=ppt/slides/slide21.xml><?xml version="1.0" encoding="utf-8"?>
+<file path=ppt/slides/slide22.xml><?xml version="1.0" encoding="utf-8"?>
 <p:sld xmlns:a="http://schemas.openxmlformats.org/drawingml/2006/main" xmlns:r="http://schemas.openxmlformats.org/officeDocument/2006/relationships" xmlns:p="http://schemas.openxmlformats.org/presentationml/2006/main">
   <p:cSld>
     <p:spTree>
@@ -9177,7 +9261,7 @@
 </p:sld>
 </file>
 
-<file path=ppt/slides/slide22.xml><?xml version="1.0" encoding="utf-8"?>
+<file path=ppt/slides/slide23.xml><?xml version="1.0" encoding="utf-8"?>
 <p:sld xmlns:a="http://schemas.openxmlformats.org/drawingml/2006/main" xmlns:r="http://schemas.openxmlformats.org/officeDocument/2006/relationships" xmlns:p="http://schemas.openxmlformats.org/presentationml/2006/main">
   <p:cSld>
     <p:spTree>
@@ -9297,7 +9381,7 @@
 </p:sld>
 </file>
 
-<file path=ppt/slides/slide23.xml><?xml version="1.0" encoding="utf-8"?>
+<file path=ppt/slides/slide24.xml><?xml version="1.0" encoding="utf-8"?>
 <p:sld xmlns:a="http://schemas.openxmlformats.org/drawingml/2006/main" xmlns:r="http://schemas.openxmlformats.org/officeDocument/2006/relationships" xmlns:p="http://schemas.openxmlformats.org/presentationml/2006/main">
   <p:cSld>
     <p:spTree>
@@ -9421,7 +9505,7 @@
 </p:sld>
 </file>
 
-<file path=ppt/slides/slide24.xml><?xml version="1.0" encoding="utf-8"?>
+<file path=ppt/slides/slide25.xml><?xml version="1.0" encoding="utf-8"?>
 <p:sld xmlns:a="http://schemas.openxmlformats.org/drawingml/2006/main" xmlns:r="http://schemas.openxmlformats.org/officeDocument/2006/relationships" xmlns:p="http://schemas.openxmlformats.org/presentationml/2006/main">
   <p:cSld>
     <p:spTree>
@@ -9577,7 +9661,7 @@
 </p:sld>
 </file>
 
-<file path=ppt/slides/slide25.xml><?xml version="1.0" encoding="utf-8"?>
+<file path=ppt/slides/slide26.xml><?xml version="1.0" encoding="utf-8"?>
 <p:sld xmlns:a="http://schemas.openxmlformats.org/drawingml/2006/main" xmlns:r="http://schemas.openxmlformats.org/officeDocument/2006/relationships" xmlns:p="http://schemas.openxmlformats.org/presentationml/2006/main">
   <p:cSld>
     <p:spTree>
@@ -9704,7 +9788,7 @@
 </p:sld>
 </file>
 
-<file path=ppt/slides/slide26.xml><?xml version="1.0" encoding="utf-8"?>
+<file path=ppt/slides/slide27.xml><?xml version="1.0" encoding="utf-8"?>
 <p:sld xmlns:a="http://schemas.openxmlformats.org/drawingml/2006/main" xmlns:r="http://schemas.openxmlformats.org/officeDocument/2006/relationships" xmlns:p="http://schemas.openxmlformats.org/presentationml/2006/main">
   <p:cSld>
     <p:spTree>
@@ -9792,7 +9876,7 @@
 </p:sld>
 </file>
 
-<file path=ppt/slides/slide27.xml><?xml version="1.0" encoding="utf-8"?>
+<file path=ppt/slides/slide28.xml><?xml version="1.0" encoding="utf-8"?>
 <p:sld xmlns:a="http://schemas.openxmlformats.org/drawingml/2006/main" xmlns:r="http://schemas.openxmlformats.org/officeDocument/2006/relationships" xmlns:p="http://schemas.openxmlformats.org/presentationml/2006/main">
   <p:cSld>
     <p:spTree>
@@ -9875,7 +9959,7 @@
 </p:sld>
 </file>
 
-<file path=ppt/slides/slide28.xml><?xml version="1.0" encoding="utf-8"?>
+<file path=ppt/slides/slide29.xml><?xml version="1.0" encoding="utf-8"?>
 <p:sld xmlns:a="http://schemas.openxmlformats.org/drawingml/2006/main" xmlns:r="http://schemas.openxmlformats.org/officeDocument/2006/relationships" xmlns:p="http://schemas.openxmlformats.org/presentationml/2006/main">
   <p:cSld>
     <p:spTree>
@@ -9973,7 +10057,118 @@
 </p:sld>
 </file>
 
-<file path=ppt/slides/slide29.xml><?xml version="1.0" encoding="utf-8"?>
+<file path=ppt/slides/slide3.xml><?xml version="1.0" encoding="utf-8"?>
+<p:sld xmlns:a="http://schemas.openxmlformats.org/drawingml/2006/main" xmlns:r="http://schemas.openxmlformats.org/officeDocument/2006/relationships" xmlns:p="http://schemas.openxmlformats.org/presentationml/2006/main">
+  <p:cSld>
+    <p:spTree>
+      <p:nvGrpSpPr>
+        <p:cNvPr id="1" name=""/>
+        <p:cNvGrpSpPr/>
+        <p:nvPr/>
+      </p:nvGrpSpPr>
+      <p:grpSpPr>
+        <a:xfrm>
+          <a:off x="0" y="0"/>
+          <a:ext cx="0" cy="0"/>
+          <a:chOff x="0" y="0"/>
+          <a:chExt cx="0" cy="0"/>
+        </a:xfrm>
+      </p:grpSpPr>
+      <p:sp>
+        <p:nvSpPr>
+          <p:cNvPr id="2" name="Title 1">
+            <a:extLst>
+              <a:ext uri="{FF2B5EF4-FFF2-40B4-BE49-F238E27FC236}">
+                <a16:creationId xmlns:a16="http://schemas.microsoft.com/office/drawing/2014/main" id="{CDDBD12E-6F6E-1FA0-4C05-06CDA68193E6}"/>
+              </a:ext>
+            </a:extLst>
+          </p:cNvPr>
+          <p:cNvSpPr>
+            <a:spLocks noGrp="1"/>
+          </p:cNvSpPr>
+          <p:nvPr>
+            <p:ph type="title"/>
+          </p:nvPr>
+        </p:nvSpPr>
+        <p:spPr/>
+        <p:txBody>
+          <a:bodyPr>
+            <a:normAutofit/>
+          </a:bodyPr>
+          <a:lstStyle/>
+          <a:p>
+            <a:r>
+              <a:rPr lang="en-IN" dirty="0"/>
+              <a:t>&lt;Lc/</a:t>
+            </a:r>
+            <a:r>
+              <a:rPr lang="en-IN" dirty="0" err="1"/>
+              <a:t>nc</a:t>
+            </a:r>
+            <a:r>
+              <a:rPr lang="en-IN" dirty="0"/>
+              <a:t>&gt; - LOW CODE/NO CODE </a:t>
+            </a:r>
+            <a:r>
+              <a:rPr lang="en-IN" dirty="0" err="1"/>
+              <a:t>Devops</a:t>
+            </a:r>
+            <a:br>
+              <a:rPr lang="en-IN" dirty="0"/>
+            </a:br>
+            <a:r>
+              <a:rPr lang="en-IN" sz="2400" dirty="0"/>
+              <a:t>to Everything as CODE</a:t>
+            </a:r>
+            <a:endParaRPr lang="en-IN" dirty="0"/>
+          </a:p>
+        </p:txBody>
+      </p:sp>
+      <p:graphicFrame>
+        <p:nvGraphicFramePr>
+          <p:cNvPr id="4" name="Content Placeholder 3">
+            <a:extLst>
+              <a:ext uri="{FF2B5EF4-FFF2-40B4-BE49-F238E27FC236}">
+                <a16:creationId xmlns:a16="http://schemas.microsoft.com/office/drawing/2014/main" id="{A5618265-EB56-DCB9-04E7-2B2A5A566A22}"/>
+              </a:ext>
+            </a:extLst>
+          </p:cNvPr>
+          <p:cNvGraphicFramePr>
+            <a:graphicFrameLocks noGrp="1"/>
+          </p:cNvGraphicFramePr>
+          <p:nvPr>
+            <p:ph idx="1"/>
+            <p:extLst>
+              <p:ext uri="{D42A27DB-BD31-4B8C-83A1-F6EECF244321}">
+                <p14:modId xmlns:p14="http://schemas.microsoft.com/office/powerpoint/2010/main" val="241221072"/>
+              </p:ext>
+            </p:extLst>
+          </p:nvPr>
+        </p:nvGraphicFramePr>
+        <p:xfrm>
+          <a:off x="1069848" y="2121408"/>
+          <a:ext cx="10058400" cy="4050792"/>
+        </p:xfrm>
+        <a:graphic>
+          <a:graphicData uri="http://schemas.openxmlformats.org/drawingml/2006/diagram">
+            <dgm:relIds xmlns:dgm="http://schemas.openxmlformats.org/drawingml/2006/diagram" xmlns:r="http://schemas.openxmlformats.org/officeDocument/2006/relationships" r:dm="rId2" r:lo="rId3" r:qs="rId4" r:cs="rId5"/>
+          </a:graphicData>
+        </a:graphic>
+      </p:graphicFrame>
+    </p:spTree>
+    <p:extLst>
+      <p:ext uri="{BB962C8B-B14F-4D97-AF65-F5344CB8AC3E}">
+        <p14:creationId xmlns:p14="http://schemas.microsoft.com/office/powerpoint/2010/main" val="3591333091"/>
+      </p:ext>
+    </p:extLst>
+  </p:cSld>
+  <p:clrMapOvr>
+    <a:masterClrMapping/>
+  </p:clrMapOvr>
+</p:sld>
+</file>
+
+<file path=ppt/slides/slide30.xml><?xml version="1.0" encoding="utf-8"?>
 <p:sld xmlns:a="http://schemas.openxmlformats.org/drawingml/2006/main" xmlns:r="http://schemas.openxmlformats.org/officeDocument/2006/relationships" xmlns:p="http://schemas.openxmlformats.org/presentationml/2006/main">
   <p:cSld>
     <p:spTree>
@@ -11559,118 +11754,7 @@
 </p:sld>
 </file>
 
-<file path=ppt/slides/slide3.xml><?xml version="1.0" encoding="utf-8"?>
-<p:sld xmlns:a="http://schemas.openxmlformats.org/drawingml/2006/main" xmlns:r="http://schemas.openxmlformats.org/officeDocument/2006/relationships" xmlns:p="http://schemas.openxmlformats.org/presentationml/2006/main">
-  <p:cSld>
-    <p:spTree>
-      <p:nvGrpSpPr>
-        <p:cNvPr id="1" name=""/>
-        <p:cNvGrpSpPr/>
-        <p:nvPr/>
-      </p:nvGrpSpPr>
-      <p:grpSpPr>
-        <a:xfrm>
-          <a:off x="0" y="0"/>
-          <a:ext cx="0" cy="0"/>
-          <a:chOff x="0" y="0"/>
-          <a:chExt cx="0" cy="0"/>
-        </a:xfrm>
-      </p:grpSpPr>
-      <p:sp>
-        <p:nvSpPr>
-          <p:cNvPr id="2" name="Title 1">
-            <a:extLst>
-              <a:ext uri="{FF2B5EF4-FFF2-40B4-BE49-F238E27FC236}">
-                <a16:creationId xmlns:a16="http://schemas.microsoft.com/office/drawing/2014/main" id="{CDDBD12E-6F6E-1FA0-4C05-06CDA68193E6}"/>
-              </a:ext>
-            </a:extLst>
-          </p:cNvPr>
-          <p:cNvSpPr>
-            <a:spLocks noGrp="1"/>
-          </p:cNvSpPr>
-          <p:nvPr>
-            <p:ph type="title"/>
-          </p:nvPr>
-        </p:nvSpPr>
-        <p:spPr/>
-        <p:txBody>
-          <a:bodyPr>
-            <a:normAutofit/>
-          </a:bodyPr>
-          <a:lstStyle/>
-          <a:p>
-            <a:r>
-              <a:rPr lang="en-IN" dirty="0"/>
-              <a:t>&lt;Lc/</a:t>
-            </a:r>
-            <a:r>
-              <a:rPr lang="en-IN" dirty="0" err="1"/>
-              <a:t>nc</a:t>
-            </a:r>
-            <a:r>
-              <a:rPr lang="en-IN" dirty="0"/>
-              <a:t>&gt; - LOW CODE/NO CODE </a:t>
-            </a:r>
-            <a:r>
-              <a:rPr lang="en-IN" dirty="0" err="1"/>
-              <a:t>Devops</a:t>
-            </a:r>
-            <a:br>
-              <a:rPr lang="en-IN" dirty="0"/>
-            </a:br>
-            <a:r>
-              <a:rPr lang="en-IN" sz="2400" dirty="0"/>
-              <a:t>to Everything as CODE</a:t>
-            </a:r>
-            <a:endParaRPr lang="en-IN" dirty="0"/>
-          </a:p>
-        </p:txBody>
-      </p:sp>
-      <p:graphicFrame>
-        <p:nvGraphicFramePr>
-          <p:cNvPr id="4" name="Content Placeholder 3">
-            <a:extLst>
-              <a:ext uri="{FF2B5EF4-FFF2-40B4-BE49-F238E27FC236}">
-                <a16:creationId xmlns:a16="http://schemas.microsoft.com/office/drawing/2014/main" id="{A5618265-EB56-DCB9-04E7-2B2A5A566A22}"/>
-              </a:ext>
-            </a:extLst>
-          </p:cNvPr>
-          <p:cNvGraphicFramePr>
-            <a:graphicFrameLocks noGrp="1"/>
-          </p:cNvGraphicFramePr>
-          <p:nvPr>
-            <p:ph idx="1"/>
-            <p:extLst>
-              <p:ext uri="{D42A27DB-BD31-4B8C-83A1-F6EECF244321}">
-                <p14:modId xmlns:p14="http://schemas.microsoft.com/office/powerpoint/2010/main" val="241221072"/>
-              </p:ext>
-            </p:extLst>
-          </p:nvPr>
-        </p:nvGraphicFramePr>
-        <p:xfrm>
-          <a:off x="1069848" y="2121408"/>
-          <a:ext cx="10058400" cy="4050792"/>
-        </p:xfrm>
-        <a:graphic>
-          <a:graphicData uri="http://schemas.openxmlformats.org/drawingml/2006/diagram">
-            <dgm:relIds xmlns:dgm="http://schemas.openxmlformats.org/drawingml/2006/diagram" xmlns:r="http://schemas.openxmlformats.org/officeDocument/2006/relationships" r:dm="rId2" r:lo="rId3" r:qs="rId4" r:cs="rId5"/>
-          </a:graphicData>
-        </a:graphic>
-      </p:graphicFrame>
-    </p:spTree>
-    <p:extLst>
-      <p:ext uri="{BB962C8B-B14F-4D97-AF65-F5344CB8AC3E}">
-        <p14:creationId xmlns:p14="http://schemas.microsoft.com/office/powerpoint/2010/main" val="3591333091"/>
-      </p:ext>
-    </p:extLst>
-  </p:cSld>
-  <p:clrMapOvr>
-    <a:masterClrMapping/>
-  </p:clrMapOvr>
-</p:sld>
-</file>
-
-<file path=ppt/slides/slide30.xml><?xml version="1.0" encoding="utf-8"?>
+<file path=ppt/slides/slide31.xml><?xml version="1.0" encoding="utf-8"?>
 <p:sld xmlns:a="http://schemas.openxmlformats.org/drawingml/2006/main" xmlns:r="http://schemas.openxmlformats.org/officeDocument/2006/relationships" xmlns:p="http://schemas.openxmlformats.org/presentationml/2006/main">
   <p:cSld>
     <p:spTree>
@@ -12275,7 +12359,7 @@
 </p:sld>
 </file>
 
-<file path=ppt/slides/slide31.xml><?xml version="1.0" encoding="utf-8"?>
+<file path=ppt/slides/slide32.xml><?xml version="1.0" encoding="utf-8"?>
 <p:sld xmlns:a="http://schemas.openxmlformats.org/drawingml/2006/main" xmlns:r="http://schemas.openxmlformats.org/officeDocument/2006/relationships" xmlns:p="http://schemas.openxmlformats.org/presentationml/2006/main">
   <p:cSld>
     <p:spTree>
@@ -12352,7 +12436,7 @@
 </p:sld>
 </file>
 
-<file path=ppt/slides/slide32.xml><?xml version="1.0" encoding="utf-8"?>
+<file path=ppt/slides/slide33.xml><?xml version="1.0" encoding="utf-8"?>
 <p:sld xmlns:a="http://schemas.openxmlformats.org/drawingml/2006/main" xmlns:r="http://schemas.openxmlformats.org/officeDocument/2006/relationships" xmlns:p="http://schemas.openxmlformats.org/presentationml/2006/main">
   <p:cSld>
     <p:spTree>
@@ -12416,7 +12500,7 @@
 </p:sld>
 </file>
 
-<file path=ppt/slides/slide33.xml><?xml version="1.0" encoding="utf-8"?>
+<file path=ppt/slides/slide34.xml><?xml version="1.0" encoding="utf-8"?>
 <p:sld xmlns:a="http://schemas.openxmlformats.org/drawingml/2006/main" xmlns:r="http://schemas.openxmlformats.org/officeDocument/2006/relationships" xmlns:p="http://schemas.openxmlformats.org/presentationml/2006/main">
   <p:cSld>
     <p:spTree>

</xml_diff>

<commit_message>
PPT with Hello World Details
</commit_message>
<xml_diff>
--- a/docs/IaC_Devopedia_Sep_2022.pptx
+++ b/docs/IaC_Devopedia_Sep_2022.pptx
@@ -3516,7 +3516,7 @@
           <a:p>
             <a:fld id="{4567C160-2C30-4694-9FA0-F603C7AEC858}" type="datetimeFigureOut">
               <a:rPr lang="en-IN" smtClean="0"/>
-              <a:t>25-08-2022</a:t>
+              <a:t>26-08-2022</a:t>
             </a:fld>
             <a:endParaRPr lang="en-IN"/>
           </a:p>
@@ -3695,7 +3695,7 @@
           <a:p>
             <a:fld id="{4567C160-2C30-4694-9FA0-F603C7AEC858}" type="datetimeFigureOut">
               <a:rPr lang="en-IN" smtClean="0"/>
-              <a:t>25-08-2022</a:t>
+              <a:t>26-08-2022</a:t>
             </a:fld>
             <a:endParaRPr lang="en-IN"/>
           </a:p>
@@ -3875,7 +3875,7 @@
           <a:p>
             <a:fld id="{4567C160-2C30-4694-9FA0-F603C7AEC858}" type="datetimeFigureOut">
               <a:rPr lang="en-IN" smtClean="0"/>
-              <a:t>25-08-2022</a:t>
+              <a:t>26-08-2022</a:t>
             </a:fld>
             <a:endParaRPr lang="en-IN"/>
           </a:p>
@@ -3963,16 +3963,26 @@
             <p:ph type="title"/>
           </p:nvPr>
         </p:nvSpPr>
-        <p:spPr/>
+        <p:spPr>
+          <a:xfrm>
+            <a:off x="0" y="0"/>
+            <a:ext cx="12192000" cy="989814"/>
+          </a:xfrm>
+        </p:spPr>
         <p:txBody>
-          <a:bodyPr/>
-          <a:lstStyle/>
-          <a:p>
-            <a:r>
-              <a:rPr lang="en-US"/>
+          <a:bodyPr>
+            <a:normAutofit/>
+          </a:bodyPr>
+          <a:lstStyle>
+            <a:lvl1pPr>
+              <a:defRPr sz="4400"/>
+            </a:lvl1pPr>
+          </a:lstStyle>
+          <a:p>
+            <a:r>
+              <a:rPr lang="en-US" dirty="0"/>
               <a:t>Click to edit Master title style</a:t>
             </a:r>
-            <a:endParaRPr lang="en-US" dirty="0"/>
           </a:p>
         </p:txBody>
       </p:sp>
@@ -3986,7 +3996,12 @@
             <p:ph idx="1"/>
           </p:nvPr>
         </p:nvSpPr>
-        <p:spPr/>
+        <p:spPr>
+          <a:xfrm>
+            <a:off x="0" y="989814"/>
+            <a:ext cx="12192000" cy="5182386"/>
+          </a:xfrm>
+        </p:spPr>
         <p:txBody>
           <a:bodyPr/>
           <a:lstStyle/>
@@ -4045,7 +4060,7 @@
           <a:p>
             <a:fld id="{4567C160-2C30-4694-9FA0-F603C7AEC858}" type="datetimeFigureOut">
               <a:rPr lang="en-IN" smtClean="0"/>
-              <a:t>25-08-2022</a:t>
+              <a:t>26-08-2022</a:t>
             </a:fld>
             <a:endParaRPr lang="en-IN"/>
           </a:p>
@@ -4358,7 +4373,7 @@
           <a:p>
             <a:fld id="{4567C160-2C30-4694-9FA0-F603C7AEC858}" type="datetimeFigureOut">
               <a:rPr lang="en-IN" smtClean="0"/>
-              <a:t>25-08-2022</a:t>
+              <a:t>26-08-2022</a:t>
             </a:fld>
             <a:endParaRPr lang="en-IN"/>
           </a:p>
@@ -4744,7 +4759,7 @@
           <a:p>
             <a:fld id="{4567C160-2C30-4694-9FA0-F603C7AEC858}" type="datetimeFigureOut">
               <a:rPr lang="en-IN" smtClean="0"/>
-              <a:t>25-08-2022</a:t>
+              <a:t>26-08-2022</a:t>
             </a:fld>
             <a:endParaRPr lang="en-IN"/>
           </a:p>
@@ -5178,7 +5193,7 @@
           <a:p>
             <a:fld id="{4567C160-2C30-4694-9FA0-F603C7AEC858}" type="datetimeFigureOut">
               <a:rPr lang="en-IN" smtClean="0"/>
-              <a:t>25-08-2022</a:t>
+              <a:t>26-08-2022</a:t>
             </a:fld>
             <a:endParaRPr lang="en-IN"/>
           </a:p>
@@ -5296,7 +5311,7 @@
           <a:p>
             <a:fld id="{4567C160-2C30-4694-9FA0-F603C7AEC858}" type="datetimeFigureOut">
               <a:rPr lang="en-IN" smtClean="0"/>
-              <a:t>25-08-2022</a:t>
+              <a:t>26-08-2022</a:t>
             </a:fld>
             <a:endParaRPr lang="en-IN"/>
           </a:p>
@@ -5391,7 +5406,7 @@
           <a:p>
             <a:fld id="{4567C160-2C30-4694-9FA0-F603C7AEC858}" type="datetimeFigureOut">
               <a:rPr lang="en-IN" smtClean="0"/>
-              <a:t>25-08-2022</a:t>
+              <a:t>26-08-2022</a:t>
             </a:fld>
             <a:endParaRPr lang="en-IN"/>
           </a:p>
@@ -5741,7 +5756,7 @@
           <a:p>
             <a:fld id="{4567C160-2C30-4694-9FA0-F603C7AEC858}" type="datetimeFigureOut">
               <a:rPr lang="en-IN" smtClean="0"/>
-              <a:t>25-08-2022</a:t>
+              <a:t>26-08-2022</a:t>
             </a:fld>
             <a:endParaRPr lang="en-IN"/>
           </a:p>
@@ -6166,7 +6181,7 @@
           <a:p>
             <a:fld id="{4567C160-2C30-4694-9FA0-F603C7AEC858}" type="datetimeFigureOut">
               <a:rPr lang="en-IN" smtClean="0"/>
-              <a:t>25-08-2022</a:t>
+              <a:t>26-08-2022</a:t>
             </a:fld>
             <a:endParaRPr lang="en-IN"/>
           </a:p>
@@ -6447,7 +6462,7 @@
           <a:p>
             <a:fld id="{4567C160-2C30-4694-9FA0-F603C7AEC858}" type="datetimeFigureOut">
               <a:rPr lang="en-IN" smtClean="0"/>
-              <a:t>25-08-2022</a:t>
+              <a:t>26-08-2022</a:t>
             </a:fld>
             <a:endParaRPr lang="en-IN"/>
           </a:p>
@@ -7534,7 +7549,7 @@
         <p:spPr/>
         <p:txBody>
           <a:bodyPr>
-            <a:normAutofit/>
+            <a:normAutofit fontScale="90000"/>
           </a:bodyPr>
           <a:lstStyle/>
           <a:p>
@@ -10838,12 +10853,7 @@
             <p:ph type="title"/>
           </p:nvPr>
         </p:nvSpPr>
-        <p:spPr>
-          <a:xfrm>
-            <a:off x="387927" y="484632"/>
-            <a:ext cx="10740321" cy="1609344"/>
-          </a:xfrm>
-        </p:spPr>
+        <p:spPr/>
         <p:txBody>
           <a:bodyPr/>
           <a:lstStyle/>
@@ -10851,6 +10861,147 @@
             <a:r>
               <a:rPr lang="en-IN" dirty="0"/>
               <a:t>Automated testing</a:t>
+            </a:r>
+          </a:p>
+        </p:txBody>
+      </p:sp>
+      <p:sp>
+        <p:nvSpPr>
+          <p:cNvPr id="3" name="Content Placeholder 2">
+            <a:extLst>
+              <a:ext uri="{FF2B5EF4-FFF2-40B4-BE49-F238E27FC236}">
+                <a16:creationId xmlns:a16="http://schemas.microsoft.com/office/drawing/2014/main" id="{64247F1D-6C8B-B853-3EFF-B65CA6514402}"/>
+              </a:ext>
+            </a:extLst>
+          </p:cNvPr>
+          <p:cNvSpPr>
+            <a:spLocks noGrp="1"/>
+          </p:cNvSpPr>
+          <p:nvPr>
+            <p:ph idx="1"/>
+          </p:nvPr>
+        </p:nvSpPr>
+        <p:spPr/>
+        <p:txBody>
+          <a:bodyPr/>
+          <a:lstStyle/>
+          <a:p>
+            <a:pPr marL="0" marR="0" lvl="0" indent="0" algn="l" defTabSz="914400" rtl="0" eaLnBrk="0" fontAlgn="base" latinLnBrk="0" hangingPunct="0">
+              <a:lnSpc>
+                <a:spcPct val="100000"/>
+              </a:lnSpc>
+              <a:spcBef>
+                <a:spcPct val="0"/>
+              </a:spcBef>
+              <a:spcAft>
+                <a:spcPct val="0"/>
+              </a:spcAft>
+              <a:buClrTx/>
+              <a:buSzTx/>
+              <a:buFontTx/>
+              <a:buNone/>
+              <a:tabLst/>
+            </a:pPr>
+            <a:r>
+              <a:rPr lang="en-US" altLang="en-US" sz="2000" dirty="0"/>
+              <a:t>Provides multiple testing styles</a:t>
+            </a:r>
+          </a:p>
+          <a:p>
+            <a:pPr marL="0" marR="0" lvl="0" indent="0" algn="l" defTabSz="914400" rtl="0" eaLnBrk="0" fontAlgn="base" latinLnBrk="0" hangingPunct="0">
+              <a:lnSpc>
+                <a:spcPct val="100000"/>
+              </a:lnSpc>
+              <a:spcBef>
+                <a:spcPct val="0"/>
+              </a:spcBef>
+              <a:spcAft>
+                <a:spcPct val="0"/>
+              </a:spcAft>
+              <a:buClrTx/>
+              <a:buSzTx/>
+              <a:buFontTx/>
+              <a:buNone/>
+              <a:tabLst/>
+            </a:pPr>
+            <a:endParaRPr lang="en-US" altLang="en-US" sz="2000" dirty="0"/>
+          </a:p>
+          <a:p>
+            <a:pPr marL="0" marR="0" lvl="0" indent="0" algn="l" defTabSz="914400" rtl="0" eaLnBrk="0" fontAlgn="base" latinLnBrk="0" hangingPunct="0">
+              <a:lnSpc>
+                <a:spcPct val="100000"/>
+              </a:lnSpc>
+              <a:spcBef>
+                <a:spcPct val="0"/>
+              </a:spcBef>
+              <a:spcAft>
+                <a:spcPct val="0"/>
+              </a:spcAft>
+              <a:buClrTx/>
+              <a:buSzTx/>
+              <a:buFontTx/>
+              <a:buChar char="•"/>
+              <a:tabLst/>
+            </a:pPr>
+            <a:r>
+              <a:rPr lang="en-US" altLang="en-US" sz="2000" b="1" dirty="0"/>
+              <a:t>Unit Tests </a:t>
+            </a:r>
+            <a:r>
+              <a:rPr lang="en-US" altLang="en-US" sz="2000" dirty="0"/>
+              <a:t>are fast in-memory tests that mock all external calls.</a:t>
+            </a:r>
+          </a:p>
+          <a:p>
+            <a:pPr marL="0" marR="0" lvl="0" indent="0" algn="l" defTabSz="914400" rtl="0" eaLnBrk="0" fontAlgn="base" latinLnBrk="0" hangingPunct="0">
+              <a:lnSpc>
+                <a:spcPct val="100000"/>
+              </a:lnSpc>
+              <a:spcBef>
+                <a:spcPct val="0"/>
+              </a:spcBef>
+              <a:spcAft>
+                <a:spcPct val="0"/>
+              </a:spcAft>
+              <a:buClrTx/>
+              <a:buSzTx/>
+              <a:buFontTx/>
+              <a:buChar char="•"/>
+              <a:tabLst/>
+            </a:pPr>
+            <a:r>
+              <a:rPr lang="en-US" altLang="en-US" sz="2000" b="1" dirty="0"/>
+              <a:t>Property Tests </a:t>
+            </a:r>
+            <a:r>
+              <a:rPr lang="en-US" altLang="en-US" sz="2000" dirty="0"/>
+              <a:t>run resource-level assertions while infrastructure is being deployed.</a:t>
+            </a:r>
+          </a:p>
+          <a:p>
+            <a:pPr marL="0" marR="0" lvl="0" indent="0" algn="l" defTabSz="914400" rtl="0" eaLnBrk="0" fontAlgn="base" latinLnBrk="0" hangingPunct="0">
+              <a:lnSpc>
+                <a:spcPct val="100000"/>
+              </a:lnSpc>
+              <a:spcBef>
+                <a:spcPct val="0"/>
+              </a:spcBef>
+              <a:spcAft>
+                <a:spcPct val="0"/>
+              </a:spcAft>
+              <a:buClrTx/>
+              <a:buSzTx/>
+              <a:buFontTx/>
+              <a:buChar char="•"/>
+              <a:tabLst/>
+            </a:pPr>
+            <a:r>
+              <a:rPr lang="en-US" altLang="en-US" sz="2000" b="1" dirty="0"/>
+              <a:t>Integration Tests </a:t>
+            </a:r>
+            <a:r>
+              <a:rPr lang="en-US" altLang="en-US" sz="2000" dirty="0"/>
+              <a:t>deploy ephemeral infrastructure and run external tests against it.</a:t>
             </a:r>
           </a:p>
         </p:txBody>
@@ -10870,13 +11021,13 @@
           <p:nvPr>
             <p:extLst>
               <p:ext uri="{D42A27DB-BD31-4B8C-83A1-F6EECF244321}">
-                <p14:modId xmlns:p14="http://schemas.microsoft.com/office/powerpoint/2010/main" val="102573910"/>
+                <p14:modId xmlns:p14="http://schemas.microsoft.com/office/powerpoint/2010/main" val="1134836254"/>
               </p:ext>
             </p:extLst>
           </p:nvPr>
         </p:nvGraphicFramePr>
         <p:xfrm>
-          <a:off x="278235" y="3662600"/>
+          <a:off x="165114" y="3053421"/>
           <a:ext cx="11058988" cy="2804160"/>
         </p:xfrm>
         <a:graphic>
@@ -12545,157 +12696,6 @@
           </a:graphicData>
         </a:graphic>
       </p:graphicFrame>
-      <p:sp>
-        <p:nvSpPr>
-          <p:cNvPr id="7" name="TextBox 6">
-            <a:extLst>
-              <a:ext uri="{FF2B5EF4-FFF2-40B4-BE49-F238E27FC236}">
-                <a16:creationId xmlns:a16="http://schemas.microsoft.com/office/drawing/2014/main" id="{C2735102-CD0C-CFDB-269C-2AB57214F78B}"/>
-              </a:ext>
-            </a:extLst>
-          </p:cNvPr>
-          <p:cNvSpPr txBox="1"/>
-          <p:nvPr/>
-        </p:nvSpPr>
-        <p:spPr>
-          <a:xfrm>
-            <a:off x="278235" y="1933640"/>
-            <a:ext cx="11297991" cy="1631216"/>
-          </a:xfrm>
-          <a:prstGeom prst="rect">
-            <a:avLst/>
-          </a:prstGeom>
-          <a:noFill/>
-        </p:spPr>
-        <p:txBody>
-          <a:bodyPr wrap="square">
-            <a:spAutoFit/>
-          </a:bodyPr>
-          <a:lstStyle/>
-          <a:p>
-            <a:pPr marL="0" marR="0" lvl="0" indent="0" algn="l" defTabSz="914400" rtl="0" eaLnBrk="0" fontAlgn="base" latinLnBrk="0" hangingPunct="0">
-              <a:lnSpc>
-                <a:spcPct val="100000"/>
-              </a:lnSpc>
-              <a:spcBef>
-                <a:spcPct val="0"/>
-              </a:spcBef>
-              <a:spcAft>
-                <a:spcPct val="0"/>
-              </a:spcAft>
-              <a:buClrTx/>
-              <a:buSzTx/>
-              <a:buFontTx/>
-              <a:buNone/>
-              <a:tabLst/>
-            </a:pPr>
-            <a:r>
-              <a:rPr lang="en-US" altLang="en-US" sz="2000" dirty="0"/>
-              <a:t>Similarly, Pulumi provides multiple testing styles for cloud programs:</a:t>
-            </a:r>
-          </a:p>
-          <a:p>
-            <a:pPr marL="0" marR="0" lvl="0" indent="0" algn="l" defTabSz="914400" rtl="0" eaLnBrk="0" fontAlgn="base" latinLnBrk="0" hangingPunct="0">
-              <a:lnSpc>
-                <a:spcPct val="100000"/>
-              </a:lnSpc>
-              <a:spcBef>
-                <a:spcPct val="0"/>
-              </a:spcBef>
-              <a:spcAft>
-                <a:spcPct val="0"/>
-              </a:spcAft>
-              <a:buClrTx/>
-              <a:buSzTx/>
-              <a:buFontTx/>
-              <a:buChar char="•"/>
-              <a:tabLst/>
-            </a:pPr>
-            <a:r>
-              <a:rPr lang="en-US" altLang="en-US" sz="2000" b="1" dirty="0"/>
-              <a:t>Unit Tests </a:t>
-            </a:r>
-            <a:r>
-              <a:rPr lang="en-US" altLang="en-US" sz="2000" dirty="0"/>
-              <a:t>are fast in-memory tests that mock all external calls.</a:t>
-            </a:r>
-          </a:p>
-          <a:p>
-            <a:pPr marL="0" marR="0" lvl="0" indent="0" algn="l" defTabSz="914400" rtl="0" eaLnBrk="0" fontAlgn="base" latinLnBrk="0" hangingPunct="0">
-              <a:lnSpc>
-                <a:spcPct val="100000"/>
-              </a:lnSpc>
-              <a:spcBef>
-                <a:spcPct val="0"/>
-              </a:spcBef>
-              <a:spcAft>
-                <a:spcPct val="0"/>
-              </a:spcAft>
-              <a:buClrTx/>
-              <a:buSzTx/>
-              <a:buFontTx/>
-              <a:buChar char="•"/>
-              <a:tabLst/>
-            </a:pPr>
-            <a:r>
-              <a:rPr lang="en-US" altLang="en-US" sz="2000" b="1" dirty="0"/>
-              <a:t>Property Tests </a:t>
-            </a:r>
-            <a:r>
-              <a:rPr lang="en-US" altLang="en-US" sz="2000" dirty="0"/>
-              <a:t>run resource-level assertions while infrastructure is being deployed.</a:t>
-            </a:r>
-          </a:p>
-          <a:p>
-            <a:pPr marL="0" marR="0" lvl="0" indent="0" algn="l" defTabSz="914400" rtl="0" eaLnBrk="0" fontAlgn="base" latinLnBrk="0" hangingPunct="0">
-              <a:lnSpc>
-                <a:spcPct val="100000"/>
-              </a:lnSpc>
-              <a:spcBef>
-                <a:spcPct val="0"/>
-              </a:spcBef>
-              <a:spcAft>
-                <a:spcPct val="0"/>
-              </a:spcAft>
-              <a:buClrTx/>
-              <a:buSzTx/>
-              <a:buFontTx/>
-              <a:buChar char="•"/>
-              <a:tabLst/>
-            </a:pPr>
-            <a:r>
-              <a:rPr lang="en-US" altLang="en-US" sz="2000" b="1" dirty="0"/>
-              <a:t>Integration Tests </a:t>
-            </a:r>
-            <a:r>
-              <a:rPr lang="en-US" altLang="en-US" sz="2000" dirty="0"/>
-              <a:t>deploy ephemeral infrastructure and run external tests against it.</a:t>
-            </a:r>
-          </a:p>
-          <a:p>
-            <a:pPr marL="0" marR="0" lvl="0" indent="0" algn="l" defTabSz="914400" rtl="0" eaLnBrk="0" fontAlgn="base" latinLnBrk="0" hangingPunct="0">
-              <a:lnSpc>
-                <a:spcPct val="100000"/>
-              </a:lnSpc>
-              <a:spcBef>
-                <a:spcPct val="0"/>
-              </a:spcBef>
-              <a:spcAft>
-                <a:spcPct val="0"/>
-              </a:spcAft>
-              <a:buClrTx/>
-              <a:buSzTx/>
-              <a:buFontTx/>
-              <a:buNone/>
-              <a:tabLst/>
-            </a:pPr>
-            <a:r>
-              <a:rPr lang="en-US" altLang="en-US" sz="2000" dirty="0"/>
-              <a:t>The following table summarizes the differences between the three approaches:</a:t>
-            </a:r>
-          </a:p>
-        </p:txBody>
-      </p:sp>
     </p:spTree>
     <p:extLst>
       <p:ext uri="{BB962C8B-B14F-4D97-AF65-F5344CB8AC3E}">
@@ -12745,7 +12745,7 @@
         <p:spPr/>
         <p:txBody>
           <a:bodyPr>
-            <a:normAutofit/>
+            <a:normAutofit fontScale="90000"/>
           </a:bodyPr>
           <a:lstStyle/>
           <a:p>
@@ -12885,7 +12885,7 @@
         <p:spPr/>
         <p:txBody>
           <a:bodyPr>
-            <a:normAutofit fontScale="70000" lnSpcReduction="20000"/>
+            <a:normAutofit fontScale="92500" lnSpcReduction="20000"/>
           </a:bodyPr>
           <a:lstStyle/>
           <a:p>
@@ -13279,7 +13279,12 @@
             <p:ph idx="1"/>
           </p:nvPr>
         </p:nvSpPr>
-        <p:spPr/>
+        <p:spPr>
+          <a:xfrm>
+            <a:off x="0" y="2121408"/>
+            <a:ext cx="4519749" cy="4050792"/>
+          </a:xfrm>
+        </p:spPr>
         <p:txBody>
           <a:bodyPr/>
           <a:lstStyle/>
@@ -13359,10 +13364,151 @@
             <a:endParaRPr lang="en-IN" dirty="0"/>
           </a:p>
           <a:p>
+            <a:r>
+              <a:rPr lang="en-IN" dirty="0">
+                <a:hlinkClick r:id="rId3"/>
+              </a:rPr>
+              <a:t>https://</a:t>
+            </a:r>
+            <a:r>
+              <a:rPr lang="en-IN" dirty="0" err="1">
+                <a:hlinkClick r:id="rId3"/>
+              </a:rPr>
+              <a:t>s3.console.aws.amazon.com</a:t>
+            </a:r>
+            <a:r>
+              <a:rPr lang="en-IN" dirty="0">
+                <a:hlinkClick r:id="rId3"/>
+              </a:rPr>
+              <a:t>/</a:t>
+            </a:r>
+            <a:r>
+              <a:rPr lang="en-IN" dirty="0" err="1">
+                <a:hlinkClick r:id="rId3"/>
+              </a:rPr>
+              <a:t>s3</a:t>
+            </a:r>
+            <a:r>
+              <a:rPr lang="en-IN" dirty="0">
+                <a:hlinkClick r:id="rId3"/>
+              </a:rPr>
+              <a:t>/buckets</a:t>
+            </a:r>
+            <a:endParaRPr lang="en-IN" dirty="0"/>
+          </a:p>
+          <a:p>
+            <a:r>
+              <a:rPr lang="en-IN" dirty="0">
+                <a:hlinkClick r:id="rId4"/>
+              </a:rPr>
+              <a:t>https://</a:t>
+            </a:r>
+            <a:r>
+              <a:rPr lang="en-IN" dirty="0" err="1">
+                <a:hlinkClick r:id="rId4"/>
+              </a:rPr>
+              <a:t>app.pulumi.com</a:t>
+            </a:r>
+            <a:r>
+              <a:rPr lang="en-IN" dirty="0">
+                <a:hlinkClick r:id="rId4"/>
+              </a:rPr>
+              <a:t>/nagkumar/</a:t>
+            </a:r>
+            <a:r>
+              <a:rPr lang="en-IN" dirty="0" err="1">
+                <a:hlinkClick r:id="rId4"/>
+              </a:rPr>
+              <a:t>hw</a:t>
+            </a:r>
+            <a:r>
+              <a:rPr lang="en-IN" dirty="0">
+                <a:hlinkClick r:id="rId4"/>
+              </a:rPr>
+              <a:t>/dev/updates/19</a:t>
+            </a:r>
+            <a:r>
+              <a:rPr lang="en-IN" dirty="0"/>
+              <a:t> - PU</a:t>
+            </a:r>
+          </a:p>
+          <a:p>
+            <a:r>
+              <a:rPr lang="en-IN" dirty="0">
+                <a:hlinkClick r:id="rId5"/>
+              </a:rPr>
+              <a:t>https://</a:t>
+            </a:r>
+            <a:r>
+              <a:rPr lang="en-IN" dirty="0" err="1">
+                <a:hlinkClick r:id="rId5"/>
+              </a:rPr>
+              <a:t>app.pulumi.com</a:t>
+            </a:r>
+            <a:r>
+              <a:rPr lang="en-IN" dirty="0">
+                <a:hlinkClick r:id="rId5"/>
+              </a:rPr>
+              <a:t>/nagkumar/</a:t>
+            </a:r>
+            <a:r>
+              <a:rPr lang="en-IN" dirty="0" err="1">
+                <a:hlinkClick r:id="rId5"/>
+              </a:rPr>
+              <a:t>hw</a:t>
+            </a:r>
+            <a:r>
+              <a:rPr lang="en-IN" dirty="0">
+                <a:hlinkClick r:id="rId5"/>
+              </a:rPr>
+              <a:t>/dev/updates/20-</a:t>
+            </a:r>
+            <a:r>
+              <a:rPr lang="en-IN" dirty="0"/>
+              <a:t> PD</a:t>
+            </a:r>
+          </a:p>
+          <a:p>
+            <a:endParaRPr lang="en-IN" dirty="0"/>
+          </a:p>
+          <a:p>
+            <a:endParaRPr lang="en-IN" dirty="0"/>
+          </a:p>
+          <a:p>
             <a:endParaRPr lang="en-IN" dirty="0"/>
           </a:p>
         </p:txBody>
       </p:sp>
+      <p:pic>
+        <p:nvPicPr>
+          <p:cNvPr id="5" name="Picture 4">
+            <a:extLst>
+              <a:ext uri="{FF2B5EF4-FFF2-40B4-BE49-F238E27FC236}">
+                <a16:creationId xmlns:a16="http://schemas.microsoft.com/office/drawing/2014/main" id="{3EA405A0-0D46-0C24-3D07-DF4DF94CD3F1}"/>
+              </a:ext>
+            </a:extLst>
+          </p:cNvPr>
+          <p:cNvPicPr>
+            <a:picLocks noChangeAspect="1"/>
+          </p:cNvPicPr>
+          <p:nvPr/>
+        </p:nvPicPr>
+        <p:blipFill>
+          <a:blip r:embed="rId6"/>
+          <a:stretch>
+            <a:fillRect/>
+          </a:stretch>
+        </p:blipFill>
+        <p:spPr>
+          <a:xfrm>
+            <a:off x="4519749" y="1881052"/>
+            <a:ext cx="8444231" cy="4492316"/>
+          </a:xfrm>
+          <a:prstGeom prst="rect">
+            <a:avLst/>
+          </a:prstGeom>
+        </p:spPr>
+      </p:pic>
     </p:spTree>
     <p:extLst>
       <p:ext uri="{BB962C8B-B14F-4D97-AF65-F5344CB8AC3E}">
@@ -13415,8 +13561,12 @@
           <a:lstStyle/>
           <a:p>
             <a:r>
+              <a:rPr lang="en-IN" dirty="0" err="1"/>
+              <a:t>HW</a:t>
+            </a:r>
+            <a:r>
               <a:rPr lang="en-IN" dirty="0"/>
-              <a:t>Example gcp bucket</a:t>
+              <a:t> - gcp bucket</a:t>
             </a:r>
           </a:p>
         </p:txBody>
@@ -13504,8 +13654,161 @@
             </a:r>
             <a:endParaRPr lang="en-IN" dirty="0"/>
           </a:p>
+          <a:p>
+            <a:r>
+              <a:rPr lang="en-IN" dirty="0">
+                <a:hlinkClick r:id="rId3"/>
+              </a:rPr>
+              <a:t>https://</a:t>
+            </a:r>
+            <a:r>
+              <a:rPr lang="en-IN" dirty="0" err="1">
+                <a:hlinkClick r:id="rId3"/>
+              </a:rPr>
+              <a:t>console.cloud.google.com</a:t>
+            </a:r>
+            <a:r>
+              <a:rPr lang="en-IN" dirty="0">
+                <a:hlinkClick r:id="rId3"/>
+              </a:rPr>
+              <a:t>/storage/</a:t>
+            </a:r>
+            <a:r>
+              <a:rPr lang="en-IN" dirty="0" err="1">
+                <a:hlinkClick r:id="rId3"/>
+              </a:rPr>
+              <a:t>browser?referrer</a:t>
+            </a:r>
+            <a:r>
+              <a:rPr lang="en-IN" dirty="0">
+                <a:hlinkClick r:id="rId3"/>
+              </a:rPr>
+              <a:t>=</a:t>
+            </a:r>
+            <a:r>
+              <a:rPr lang="en-IN" dirty="0" err="1">
+                <a:hlinkClick r:id="rId3"/>
+              </a:rPr>
+              <a:t>search&amp;project</a:t>
+            </a:r>
+            <a:r>
+              <a:rPr lang="en-IN" dirty="0">
+                <a:hlinkClick r:id="rId3"/>
+              </a:rPr>
+              <a:t>=</a:t>
+            </a:r>
+            <a:r>
+              <a:rPr lang="en-IN" dirty="0" err="1">
+                <a:hlinkClick r:id="rId3"/>
+              </a:rPr>
+              <a:t>testgcp-360409&amp;prefix</a:t>
+            </a:r>
+            <a:r>
+              <a:rPr lang="en-IN" dirty="0">
+                <a:hlinkClick r:id="rId3"/>
+              </a:rPr>
+              <a:t>=</a:t>
+            </a:r>
+            <a:endParaRPr lang="en-IN" dirty="0"/>
+          </a:p>
+          <a:p>
+            <a:r>
+              <a:rPr lang="en-IN" dirty="0">
+                <a:hlinkClick r:id="rId4"/>
+              </a:rPr>
+              <a:t>https://</a:t>
+            </a:r>
+            <a:r>
+              <a:rPr lang="en-IN" dirty="0" err="1">
+                <a:hlinkClick r:id="rId4"/>
+              </a:rPr>
+              <a:t>app.pulumi.com</a:t>
+            </a:r>
+            <a:r>
+              <a:rPr lang="en-IN" dirty="0">
+                <a:hlinkClick r:id="rId4"/>
+              </a:rPr>
+              <a:t>/nagkumar/</a:t>
+            </a:r>
+            <a:r>
+              <a:rPr lang="en-IN" dirty="0" err="1">
+                <a:hlinkClick r:id="rId4"/>
+              </a:rPr>
+              <a:t>ramu</a:t>
+            </a:r>
+            <a:r>
+              <a:rPr lang="en-IN" dirty="0">
+                <a:hlinkClick r:id="rId4"/>
+              </a:rPr>
+              <a:t>/dev/updates/16</a:t>
+            </a:r>
+            <a:endParaRPr lang="en-IN" dirty="0"/>
+          </a:p>
+          <a:p>
+            <a:r>
+              <a:rPr lang="en-IN" dirty="0">
+                <a:hlinkClick r:id="rId5"/>
+              </a:rPr>
+              <a:t>https://</a:t>
+            </a:r>
+            <a:r>
+              <a:rPr lang="en-IN" dirty="0" err="1">
+                <a:hlinkClick r:id="rId5"/>
+              </a:rPr>
+              <a:t>app.pulumi.com</a:t>
+            </a:r>
+            <a:r>
+              <a:rPr lang="en-IN" dirty="0">
+                <a:hlinkClick r:id="rId5"/>
+              </a:rPr>
+              <a:t>/nagkumar/</a:t>
+            </a:r>
+            <a:r>
+              <a:rPr lang="en-IN" dirty="0" err="1">
+                <a:hlinkClick r:id="rId5"/>
+              </a:rPr>
+              <a:t>ramu</a:t>
+            </a:r>
+            <a:r>
+              <a:rPr lang="en-IN" dirty="0">
+                <a:hlinkClick r:id="rId5"/>
+              </a:rPr>
+              <a:t>/dev/updates/17</a:t>
+            </a:r>
+            <a:endParaRPr lang="en-IN" dirty="0"/>
+          </a:p>
         </p:txBody>
       </p:sp>
+      <p:pic>
+        <p:nvPicPr>
+          <p:cNvPr id="6" name="Picture 5">
+            <a:extLst>
+              <a:ext uri="{FF2B5EF4-FFF2-40B4-BE49-F238E27FC236}">
+                <a16:creationId xmlns:a16="http://schemas.microsoft.com/office/drawing/2014/main" id="{BEFF396D-E10D-355A-A137-7DD09E719E70}"/>
+              </a:ext>
+            </a:extLst>
+          </p:cNvPr>
+          <p:cNvPicPr>
+            <a:picLocks noChangeAspect="1"/>
+          </p:cNvPicPr>
+          <p:nvPr/>
+        </p:nvPicPr>
+        <p:blipFill>
+          <a:blip r:embed="rId6"/>
+          <a:stretch>
+            <a:fillRect/>
+          </a:stretch>
+        </p:blipFill>
+        <p:spPr>
+          <a:xfrm>
+            <a:off x="0" y="3502906"/>
+            <a:ext cx="12192000" cy="2587658"/>
+          </a:xfrm>
+          <a:prstGeom prst="rect">
+            <a:avLst/>
+          </a:prstGeom>
+        </p:spPr>
+      </p:pic>
     </p:spTree>
     <p:extLst>
       <p:ext uri="{BB962C8B-B14F-4D97-AF65-F5344CB8AC3E}">
@@ -13552,7 +13855,12 @@
             <p:ph type="title"/>
           </p:nvPr>
         </p:nvSpPr>
-        <p:spPr/>
+        <p:spPr>
+          <a:xfrm>
+            <a:off x="0" y="0"/>
+            <a:ext cx="10058400" cy="1609344"/>
+          </a:xfrm>
+        </p:spPr>
         <p:txBody>
           <a:bodyPr/>
           <a:lstStyle/>
@@ -13580,7 +13888,12 @@
             <p:ph idx="1"/>
           </p:nvPr>
         </p:nvSpPr>
-        <p:spPr/>
+        <p:spPr>
+          <a:xfrm>
+            <a:off x="43992" y="1111373"/>
+            <a:ext cx="12104016" cy="4050792"/>
+          </a:xfrm>
+        </p:spPr>
         <p:txBody>
           <a:bodyPr/>
           <a:lstStyle/>
@@ -13657,10 +13970,152 @@
               </a:rPr>
               <a:t>hw</a:t>
             </a:r>
+            <a:endParaRPr lang="fr-FR" dirty="0"/>
+          </a:p>
+          <a:p>
+            <a:r>
+              <a:rPr lang="en-IN" dirty="0">
+                <a:hlinkClick r:id="rId3"/>
+              </a:rPr>
+              <a:t>https://</a:t>
+            </a:r>
+            <a:r>
+              <a:rPr lang="en-IN" dirty="0" err="1">
+                <a:hlinkClick r:id="rId3"/>
+              </a:rPr>
+              <a:t>portal.azure.com</a:t>
+            </a:r>
+            <a:r>
+              <a:rPr lang="en-IN" dirty="0">
+                <a:hlinkClick r:id="rId3"/>
+              </a:rPr>
+              <a:t>/#view/</a:t>
+            </a:r>
+            <a:r>
+              <a:rPr lang="en-IN" dirty="0" err="1">
+                <a:hlinkClick r:id="rId3"/>
+              </a:rPr>
+              <a:t>HubsExtension</a:t>
+            </a:r>
+            <a:r>
+              <a:rPr lang="en-IN" dirty="0">
+                <a:hlinkClick r:id="rId3"/>
+              </a:rPr>
+              <a:t>/</a:t>
+            </a:r>
+            <a:r>
+              <a:rPr lang="en-IN" dirty="0" err="1">
+                <a:hlinkClick r:id="rId3"/>
+              </a:rPr>
+              <a:t>BrowseResource</a:t>
+            </a:r>
+            <a:r>
+              <a:rPr lang="en-IN" dirty="0">
+                <a:hlinkClick r:id="rId3"/>
+              </a:rPr>
+              <a:t>/</a:t>
+            </a:r>
+            <a:r>
+              <a:rPr lang="en-IN" dirty="0" err="1">
+                <a:hlinkClick r:id="rId3"/>
+              </a:rPr>
+              <a:t>resourceType</a:t>
+            </a:r>
+            <a:r>
+              <a:rPr lang="en-IN" dirty="0">
+                <a:hlinkClick r:id="rId3"/>
+              </a:rPr>
+              <a:t>/</a:t>
+            </a:r>
+            <a:r>
+              <a:rPr lang="en-IN" dirty="0" err="1">
+                <a:hlinkClick r:id="rId3"/>
+              </a:rPr>
+              <a:t>Microsoft.Storage%2FStorageAccounts</a:t>
+            </a:r>
+            <a:endParaRPr lang="fr-FR" dirty="0"/>
+          </a:p>
+          <a:p>
+            <a:r>
+              <a:rPr lang="en-IN" dirty="0"/>
+              <a:t> </a:t>
+            </a:r>
+            <a:r>
+              <a:rPr lang="en-IN" dirty="0">
+                <a:hlinkClick r:id="rId4"/>
+              </a:rPr>
+              <a:t>https://</a:t>
+            </a:r>
+            <a:r>
+              <a:rPr lang="en-IN" dirty="0" err="1">
+                <a:hlinkClick r:id="rId4"/>
+              </a:rPr>
+              <a:t>app.pulumi.com</a:t>
+            </a:r>
+            <a:r>
+              <a:rPr lang="en-IN" dirty="0">
+                <a:hlinkClick r:id="rId4"/>
+              </a:rPr>
+              <a:t>/nagkumar/azure/dev/updates/11</a:t>
+            </a:r>
+            <a:endParaRPr lang="fr-FR" dirty="0"/>
+          </a:p>
+          <a:p>
+            <a:r>
+              <a:rPr lang="en-IN" dirty="0">
+                <a:hlinkClick r:id="rId5"/>
+              </a:rPr>
+              <a:t>https://</a:t>
+            </a:r>
+            <a:r>
+              <a:rPr lang="en-IN" dirty="0" err="1">
+                <a:hlinkClick r:id="rId5"/>
+              </a:rPr>
+              <a:t>app.pulumi.com</a:t>
+            </a:r>
+            <a:r>
+              <a:rPr lang="en-IN" dirty="0">
+                <a:hlinkClick r:id="rId5"/>
+              </a:rPr>
+              <a:t>/nagkumar/azure/dev/updates/12</a:t>
+            </a:r>
+            <a:endParaRPr lang="en-IN" dirty="0"/>
+          </a:p>
+          <a:p>
             <a:endParaRPr lang="en-IN" dirty="0"/>
           </a:p>
         </p:txBody>
       </p:sp>
+      <p:pic>
+        <p:nvPicPr>
+          <p:cNvPr id="5" name="Picture 4">
+            <a:extLst>
+              <a:ext uri="{FF2B5EF4-FFF2-40B4-BE49-F238E27FC236}">
+                <a16:creationId xmlns:a16="http://schemas.microsoft.com/office/drawing/2014/main" id="{C6197266-2A9E-2B97-101B-C59840844E0E}"/>
+              </a:ext>
+            </a:extLst>
+          </p:cNvPr>
+          <p:cNvPicPr>
+            <a:picLocks noChangeAspect="1"/>
+          </p:cNvPicPr>
+          <p:nvPr/>
+        </p:nvPicPr>
+        <p:blipFill>
+          <a:blip r:embed="rId6"/>
+          <a:stretch>
+            <a:fillRect/>
+          </a:stretch>
+        </p:blipFill>
+        <p:spPr>
+          <a:xfrm>
+            <a:off x="0" y="3136769"/>
+            <a:ext cx="12192000" cy="3367001"/>
+          </a:xfrm>
+          <a:prstGeom prst="rect">
+            <a:avLst/>
+          </a:prstGeom>
+        </p:spPr>
+      </p:pic>
     </p:spTree>
     <p:extLst>
       <p:ext uri="{BB962C8B-B14F-4D97-AF65-F5344CB8AC3E}">
@@ -13707,7 +14162,12 @@
             <p:ph type="title"/>
           </p:nvPr>
         </p:nvSpPr>
-        <p:spPr/>
+        <p:spPr>
+          <a:xfrm>
+            <a:off x="0" y="32939"/>
+            <a:ext cx="10058400" cy="1609344"/>
+          </a:xfrm>
+        </p:spPr>
         <p:txBody>
           <a:bodyPr/>
           <a:lstStyle/>

</xml_diff>